<commit_message>
UPU0304 pass, fix bug- COM disconnect
</commit_message>
<xml_diff>
--- a/SW測試進度.pptx
+++ b/SW測試進度.pptx
@@ -4,12 +4,27 @@
   <p:sldMasterIdLst>
     <p:sldMasterId id="2147483648" r:id="rId1"/>
   </p:sldMasterIdLst>
+  <p:notesMasterIdLst>
+    <p:notesMasterId r:id="rId19"/>
+  </p:notesMasterIdLst>
   <p:sldIdLst>
-    <p:sldId id="256" r:id="rId2"/>
-    <p:sldId id="257" r:id="rId3"/>
-    <p:sldId id="258" r:id="rId4"/>
+    <p:sldId id="275" r:id="rId2"/>
+    <p:sldId id="261" r:id="rId3"/>
+    <p:sldId id="262" r:id="rId4"/>
     <p:sldId id="259" r:id="rId5"/>
     <p:sldId id="260" r:id="rId6"/>
+    <p:sldId id="276" r:id="rId7"/>
+    <p:sldId id="263" r:id="rId8"/>
+    <p:sldId id="264" r:id="rId9"/>
+    <p:sldId id="272" r:id="rId10"/>
+    <p:sldId id="273" r:id="rId11"/>
+    <p:sldId id="274" r:id="rId12"/>
+    <p:sldId id="267" r:id="rId13"/>
+    <p:sldId id="268" r:id="rId14"/>
+    <p:sldId id="269" r:id="rId15"/>
+    <p:sldId id="270" r:id="rId16"/>
+    <p:sldId id="271" r:id="rId17"/>
+    <p:sldId id="265" r:id="rId18"/>
   </p:sldIdLst>
   <p:sldSz cx="12192000" cy="6858000"/>
   <p:notesSz cx="6858000" cy="9144000"/>
@@ -109,11 +124,598 @@
     </a:lvl9pPr>
   </p:defaultTextStyle>
   <p:extLst>
+    <p:ext uri="{521415D9-36F7-43E2-AB2F-B90AF26B5E84}">
+      <p14:sectionLst xmlns:p14="http://schemas.microsoft.com/office/powerpoint/2010/main">
+        <p14:section name="檔案總攬" id="{B5E67FE2-B147-417F-AC96-07E275487AB2}">
+          <p14:sldIdLst>
+            <p14:sldId id="275"/>
+            <p14:sldId id="261"/>
+            <p14:sldId id="262"/>
+          </p14:sldIdLst>
+        </p14:section>
+        <p14:section name="清大馬達(pass)" id="{33059720-AB8D-410F-97E1-A95436B4C6CB}">
+          <p14:sldIdLst>
+            <p14:sldId id="259"/>
+            <p14:sldId id="260"/>
+          </p14:sldIdLst>
+        </p14:section>
+        <p14:section name="asm(pass)" id="{9581178B-CA38-43D9-B4D5-09F8B452C796}">
+          <p14:sldIdLst>
+            <p14:sldId id="276"/>
+            <p14:sldId id="263"/>
+            <p14:sldId id="264"/>
+            <p14:sldId id="272"/>
+            <p14:sldId id="273"/>
+            <p14:sldId id="274"/>
+            <p14:sldId id="267"/>
+            <p14:sldId id="268"/>
+            <p14:sldId id="269"/>
+            <p14:sldId id="270"/>
+            <p14:sldId id="271"/>
+            <p14:sldId id="265"/>
+          </p14:sldIdLst>
+        </p14:section>
+      </p14:sectionLst>
+    </p:ext>
     <p:ext uri="{EFAFB233-063F-42B5-8137-9DF3F51BA10A}">
       <p15:sldGuideLst xmlns:p15="http://schemas.microsoft.com/office/powerpoint/2012/main"/>
     </p:ext>
   </p:extLst>
 </p:presentation>
+</file>
+
+<file path=ppt/notesMasters/notesMaster1.xml><?xml version="1.0" encoding="utf-8"?>
+<p:notesMaster xmlns:a="http://schemas.openxmlformats.org/drawingml/2006/main" xmlns:r="http://schemas.openxmlformats.org/officeDocument/2006/relationships" xmlns:p="http://schemas.openxmlformats.org/presentationml/2006/main">
+  <p:cSld>
+    <p:bg>
+      <p:bgRef idx="1001">
+        <a:schemeClr val="bg1"/>
+      </p:bgRef>
+    </p:bg>
+    <p:spTree>
+      <p:nvGrpSpPr>
+        <p:cNvPr id="1" name=""/>
+        <p:cNvGrpSpPr/>
+        <p:nvPr/>
+      </p:nvGrpSpPr>
+      <p:grpSpPr>
+        <a:xfrm>
+          <a:off x="0" y="0"/>
+          <a:ext cx="0" cy="0"/>
+          <a:chOff x="0" y="0"/>
+          <a:chExt cx="0" cy="0"/>
+        </a:xfrm>
+      </p:grpSpPr>
+      <p:sp>
+        <p:nvSpPr>
+          <p:cNvPr id="2" name="頁首版面配置區 1"/>
+          <p:cNvSpPr>
+            <a:spLocks noGrp="1"/>
+          </p:cNvSpPr>
+          <p:nvPr>
+            <p:ph type="hdr" sz="quarter"/>
+          </p:nvPr>
+        </p:nvSpPr>
+        <p:spPr>
+          <a:xfrm>
+            <a:off x="0" y="0"/>
+            <a:ext cx="2971800" cy="458788"/>
+          </a:xfrm>
+          <a:prstGeom prst="rect">
+            <a:avLst/>
+          </a:prstGeom>
+        </p:spPr>
+        <p:txBody>
+          <a:bodyPr vert="horz" lIns="91440" tIns="45720" rIns="91440" bIns="45720" rtlCol="0"/>
+          <a:lstStyle>
+            <a:lvl1pPr algn="l">
+              <a:defRPr sz="1200"/>
+            </a:lvl1pPr>
+          </a:lstStyle>
+          <a:p>
+            <a:endParaRPr lang="zh-TW" altLang="en-US"/>
+          </a:p>
+        </p:txBody>
+      </p:sp>
+      <p:sp>
+        <p:nvSpPr>
+          <p:cNvPr id="3" name="日期版面配置區 2"/>
+          <p:cNvSpPr>
+            <a:spLocks noGrp="1"/>
+          </p:cNvSpPr>
+          <p:nvPr>
+            <p:ph type="dt" idx="1"/>
+          </p:nvPr>
+        </p:nvSpPr>
+        <p:spPr>
+          <a:xfrm>
+            <a:off x="3884613" y="0"/>
+            <a:ext cx="2971800" cy="458788"/>
+          </a:xfrm>
+          <a:prstGeom prst="rect">
+            <a:avLst/>
+          </a:prstGeom>
+        </p:spPr>
+        <p:txBody>
+          <a:bodyPr vert="horz" lIns="91440" tIns="45720" rIns="91440" bIns="45720" rtlCol="0"/>
+          <a:lstStyle>
+            <a:lvl1pPr algn="r">
+              <a:defRPr sz="1200"/>
+            </a:lvl1pPr>
+          </a:lstStyle>
+          <a:p>
+            <a:fld id="{75A89703-749F-4015-BFB5-26AAAE96D055}" type="datetimeFigureOut">
+              <a:rPr lang="zh-TW" altLang="en-US" smtClean="0"/>
+              <a:t>2022/2/7</a:t>
+            </a:fld>
+            <a:endParaRPr lang="zh-TW" altLang="en-US"/>
+          </a:p>
+        </p:txBody>
+      </p:sp>
+      <p:sp>
+        <p:nvSpPr>
+          <p:cNvPr id="4" name="投影片圖像版面配置區 3"/>
+          <p:cNvSpPr>
+            <a:spLocks noGrp="1" noRot="1" noChangeAspect="1"/>
+          </p:cNvSpPr>
+          <p:nvPr>
+            <p:ph type="sldImg" idx="2"/>
+          </p:nvPr>
+        </p:nvSpPr>
+        <p:spPr>
+          <a:xfrm>
+            <a:off x="685800" y="1143000"/>
+            <a:ext cx="5486400" cy="3086100"/>
+          </a:xfrm>
+          <a:prstGeom prst="rect">
+            <a:avLst/>
+          </a:prstGeom>
+          <a:noFill/>
+          <a:ln w="12700">
+            <a:solidFill>
+              <a:prstClr val="black"/>
+            </a:solidFill>
+          </a:ln>
+        </p:spPr>
+        <p:txBody>
+          <a:bodyPr vert="horz" lIns="91440" tIns="45720" rIns="91440" bIns="45720" rtlCol="0" anchor="ctr"/>
+          <a:lstStyle/>
+          <a:p>
+            <a:endParaRPr lang="zh-TW" altLang="en-US"/>
+          </a:p>
+        </p:txBody>
+      </p:sp>
+      <p:sp>
+        <p:nvSpPr>
+          <p:cNvPr id="5" name="備忘稿版面配置區 4"/>
+          <p:cNvSpPr>
+            <a:spLocks noGrp="1"/>
+          </p:cNvSpPr>
+          <p:nvPr>
+            <p:ph type="body" sz="quarter" idx="3"/>
+          </p:nvPr>
+        </p:nvSpPr>
+        <p:spPr>
+          <a:xfrm>
+            <a:off x="685800" y="4400550"/>
+            <a:ext cx="5486400" cy="3600450"/>
+          </a:xfrm>
+          <a:prstGeom prst="rect">
+            <a:avLst/>
+          </a:prstGeom>
+        </p:spPr>
+        <p:txBody>
+          <a:bodyPr vert="horz" lIns="91440" tIns="45720" rIns="91440" bIns="45720" rtlCol="0"/>
+          <a:lstStyle/>
+          <a:p>
+            <a:pPr lvl="0"/>
+            <a:r>
+              <a:rPr lang="zh-TW" altLang="en-US" smtClean="0"/>
+              <a:t>編輯母片文字樣式</a:t>
+            </a:r>
+          </a:p>
+          <a:p>
+            <a:pPr lvl="1"/>
+            <a:r>
+              <a:rPr lang="zh-TW" altLang="en-US" smtClean="0"/>
+              <a:t>第二層</a:t>
+            </a:r>
+          </a:p>
+          <a:p>
+            <a:pPr lvl="2"/>
+            <a:r>
+              <a:rPr lang="zh-TW" altLang="en-US" smtClean="0"/>
+              <a:t>第三層</a:t>
+            </a:r>
+          </a:p>
+          <a:p>
+            <a:pPr lvl="3"/>
+            <a:r>
+              <a:rPr lang="zh-TW" altLang="en-US" smtClean="0"/>
+              <a:t>第四層</a:t>
+            </a:r>
+          </a:p>
+          <a:p>
+            <a:pPr lvl="4"/>
+            <a:r>
+              <a:rPr lang="zh-TW" altLang="en-US" smtClean="0"/>
+              <a:t>第五層</a:t>
+            </a:r>
+            <a:endParaRPr lang="zh-TW" altLang="en-US"/>
+          </a:p>
+        </p:txBody>
+      </p:sp>
+      <p:sp>
+        <p:nvSpPr>
+          <p:cNvPr id="6" name="頁尾版面配置區 5"/>
+          <p:cNvSpPr>
+            <a:spLocks noGrp="1"/>
+          </p:cNvSpPr>
+          <p:nvPr>
+            <p:ph type="ftr" sz="quarter" idx="4"/>
+          </p:nvPr>
+        </p:nvSpPr>
+        <p:spPr>
+          <a:xfrm>
+            <a:off x="0" y="8685213"/>
+            <a:ext cx="2971800" cy="458787"/>
+          </a:xfrm>
+          <a:prstGeom prst="rect">
+            <a:avLst/>
+          </a:prstGeom>
+        </p:spPr>
+        <p:txBody>
+          <a:bodyPr vert="horz" lIns="91440" tIns="45720" rIns="91440" bIns="45720" rtlCol="0" anchor="b"/>
+          <a:lstStyle>
+            <a:lvl1pPr algn="l">
+              <a:defRPr sz="1200"/>
+            </a:lvl1pPr>
+          </a:lstStyle>
+          <a:p>
+            <a:endParaRPr lang="zh-TW" altLang="en-US"/>
+          </a:p>
+        </p:txBody>
+      </p:sp>
+      <p:sp>
+        <p:nvSpPr>
+          <p:cNvPr id="7" name="投影片編號版面配置區 6"/>
+          <p:cNvSpPr>
+            <a:spLocks noGrp="1"/>
+          </p:cNvSpPr>
+          <p:nvPr>
+            <p:ph type="sldNum" sz="quarter" idx="5"/>
+          </p:nvPr>
+        </p:nvSpPr>
+        <p:spPr>
+          <a:xfrm>
+            <a:off x="3884613" y="8685213"/>
+            <a:ext cx="2971800" cy="458787"/>
+          </a:xfrm>
+          <a:prstGeom prst="rect">
+            <a:avLst/>
+          </a:prstGeom>
+        </p:spPr>
+        <p:txBody>
+          <a:bodyPr vert="horz" lIns="91440" tIns="45720" rIns="91440" bIns="45720" rtlCol="0" anchor="b"/>
+          <a:lstStyle>
+            <a:lvl1pPr algn="r">
+              <a:defRPr sz="1200"/>
+            </a:lvl1pPr>
+          </a:lstStyle>
+          <a:p>
+            <a:fld id="{1CA6448E-ADE8-4A33-A8B5-C64CAD4ACB6C}" type="slidenum">
+              <a:rPr lang="zh-TW" altLang="en-US" smtClean="0"/>
+              <a:t>‹#›</a:t>
+            </a:fld>
+            <a:endParaRPr lang="zh-TW" altLang="en-US"/>
+          </a:p>
+        </p:txBody>
+      </p:sp>
+    </p:spTree>
+    <p:extLst>
+      <p:ext uri="{BB962C8B-B14F-4D97-AF65-F5344CB8AC3E}">
+        <p14:creationId xmlns:p14="http://schemas.microsoft.com/office/powerpoint/2010/main" val="1171787376"/>
+      </p:ext>
+    </p:extLst>
+  </p:cSld>
+  <p:clrMap bg1="lt1" tx1="dk1" bg2="lt2" tx2="dk2" accent1="accent1" accent2="accent2" accent3="accent3" accent4="accent4" accent5="accent5" accent6="accent6" hlink="hlink" folHlink="folHlink"/>
+  <p:notesStyle>
+    <a:lvl1pPr marL="0" algn="l" defTabSz="914400" rtl="0" eaLnBrk="1" latinLnBrk="0" hangingPunct="1">
+      <a:defRPr sz="1200" kern="1200">
+        <a:solidFill>
+          <a:schemeClr val="tx1"/>
+        </a:solidFill>
+        <a:latin typeface="+mn-lt"/>
+        <a:ea typeface="+mn-ea"/>
+        <a:cs typeface="+mn-cs"/>
+      </a:defRPr>
+    </a:lvl1pPr>
+    <a:lvl2pPr marL="457200" algn="l" defTabSz="914400" rtl="0" eaLnBrk="1" latinLnBrk="0" hangingPunct="1">
+      <a:defRPr sz="1200" kern="1200">
+        <a:solidFill>
+          <a:schemeClr val="tx1"/>
+        </a:solidFill>
+        <a:latin typeface="+mn-lt"/>
+        <a:ea typeface="+mn-ea"/>
+        <a:cs typeface="+mn-cs"/>
+      </a:defRPr>
+    </a:lvl2pPr>
+    <a:lvl3pPr marL="914400" algn="l" defTabSz="914400" rtl="0" eaLnBrk="1" latinLnBrk="0" hangingPunct="1">
+      <a:defRPr sz="1200" kern="1200">
+        <a:solidFill>
+          <a:schemeClr val="tx1"/>
+        </a:solidFill>
+        <a:latin typeface="+mn-lt"/>
+        <a:ea typeface="+mn-ea"/>
+        <a:cs typeface="+mn-cs"/>
+      </a:defRPr>
+    </a:lvl3pPr>
+    <a:lvl4pPr marL="1371600" algn="l" defTabSz="914400" rtl="0" eaLnBrk="1" latinLnBrk="0" hangingPunct="1">
+      <a:defRPr sz="1200" kern="1200">
+        <a:solidFill>
+          <a:schemeClr val="tx1"/>
+        </a:solidFill>
+        <a:latin typeface="+mn-lt"/>
+        <a:ea typeface="+mn-ea"/>
+        <a:cs typeface="+mn-cs"/>
+      </a:defRPr>
+    </a:lvl4pPr>
+    <a:lvl5pPr marL="1828800" algn="l" defTabSz="914400" rtl="0" eaLnBrk="1" latinLnBrk="0" hangingPunct="1">
+      <a:defRPr sz="1200" kern="1200">
+        <a:solidFill>
+          <a:schemeClr val="tx1"/>
+        </a:solidFill>
+        <a:latin typeface="+mn-lt"/>
+        <a:ea typeface="+mn-ea"/>
+        <a:cs typeface="+mn-cs"/>
+      </a:defRPr>
+    </a:lvl5pPr>
+    <a:lvl6pPr marL="2286000" algn="l" defTabSz="914400" rtl="0" eaLnBrk="1" latinLnBrk="0" hangingPunct="1">
+      <a:defRPr sz="1200" kern="1200">
+        <a:solidFill>
+          <a:schemeClr val="tx1"/>
+        </a:solidFill>
+        <a:latin typeface="+mn-lt"/>
+        <a:ea typeface="+mn-ea"/>
+        <a:cs typeface="+mn-cs"/>
+      </a:defRPr>
+    </a:lvl6pPr>
+    <a:lvl7pPr marL="2743200" algn="l" defTabSz="914400" rtl="0" eaLnBrk="1" latinLnBrk="0" hangingPunct="1">
+      <a:defRPr sz="1200" kern="1200">
+        <a:solidFill>
+          <a:schemeClr val="tx1"/>
+        </a:solidFill>
+        <a:latin typeface="+mn-lt"/>
+        <a:ea typeface="+mn-ea"/>
+        <a:cs typeface="+mn-cs"/>
+      </a:defRPr>
+    </a:lvl7pPr>
+    <a:lvl8pPr marL="3200400" algn="l" defTabSz="914400" rtl="0" eaLnBrk="1" latinLnBrk="0" hangingPunct="1">
+      <a:defRPr sz="1200" kern="1200">
+        <a:solidFill>
+          <a:schemeClr val="tx1"/>
+        </a:solidFill>
+        <a:latin typeface="+mn-lt"/>
+        <a:ea typeface="+mn-ea"/>
+        <a:cs typeface="+mn-cs"/>
+      </a:defRPr>
+    </a:lvl8pPr>
+    <a:lvl9pPr marL="3657600" algn="l" defTabSz="914400" rtl="0" eaLnBrk="1" latinLnBrk="0" hangingPunct="1">
+      <a:defRPr sz="1200" kern="1200">
+        <a:solidFill>
+          <a:schemeClr val="tx1"/>
+        </a:solidFill>
+        <a:latin typeface="+mn-lt"/>
+        <a:ea typeface="+mn-ea"/>
+        <a:cs typeface="+mn-cs"/>
+      </a:defRPr>
+    </a:lvl9pPr>
+  </p:notesStyle>
+</p:notesMaster>
+</file>
+
+<file path=ppt/notesSlides/notesSlide1.xml><?xml version="1.0" encoding="utf-8"?>
+<p:notes xmlns:a="http://schemas.openxmlformats.org/drawingml/2006/main" xmlns:r="http://schemas.openxmlformats.org/officeDocument/2006/relationships" xmlns:p="http://schemas.openxmlformats.org/presentationml/2006/main">
+  <p:cSld>
+    <p:spTree>
+      <p:nvGrpSpPr>
+        <p:cNvPr id="1" name=""/>
+        <p:cNvGrpSpPr/>
+        <p:nvPr/>
+      </p:nvGrpSpPr>
+      <p:grpSpPr>
+        <a:xfrm>
+          <a:off x="0" y="0"/>
+          <a:ext cx="0" cy="0"/>
+          <a:chOff x="0" y="0"/>
+          <a:chExt cx="0" cy="0"/>
+        </a:xfrm>
+      </p:grpSpPr>
+      <p:sp>
+        <p:nvSpPr>
+          <p:cNvPr id="2" name="投影片圖像版面配置區 1"/>
+          <p:cNvSpPr>
+            <a:spLocks noGrp="1" noRot="1" noChangeAspect="1"/>
+          </p:cNvSpPr>
+          <p:nvPr>
+            <p:ph type="sldImg"/>
+          </p:nvPr>
+        </p:nvSpPr>
+        <p:spPr/>
+      </p:sp>
+      <p:sp>
+        <p:nvSpPr>
+          <p:cNvPr id="3" name="備忘稿版面配置區 2"/>
+          <p:cNvSpPr>
+            <a:spLocks noGrp="1"/>
+          </p:cNvSpPr>
+          <p:nvPr>
+            <p:ph type="body" idx="1"/>
+          </p:nvPr>
+        </p:nvSpPr>
+        <p:spPr/>
+        <p:txBody>
+          <a:bodyPr/>
+          <a:lstStyle/>
+          <a:p>
+            <a:r>
+              <a:rPr lang="zh-TW" altLang="en-US" dirty="0" smtClean="0"/>
+              <a:t>不確定綠色箭頭是否會對城市造成影響</a:t>
+            </a:r>
+            <a:r>
+              <a:rPr lang="en-US" altLang="zh-TW" dirty="0" smtClean="0"/>
+              <a:t>?</a:t>
+            </a:r>
+          </a:p>
+          <a:p>
+            <a:r>
+              <a:rPr lang="zh-TW" altLang="en-US" dirty="0" smtClean="0"/>
+              <a:t>綠色箭頭似乎不是因為檔案有錯誤</a:t>
+            </a:r>
+            <a:r>
+              <a:rPr lang="en-US" altLang="zh-TW" dirty="0" smtClean="0"/>
+              <a:t>?</a:t>
+            </a:r>
+          </a:p>
+          <a:p>
+            <a:r>
+              <a:rPr lang="zh-TW" altLang="en-US" dirty="0" smtClean="0"/>
+              <a:t>綠色箭頭參考資料</a:t>
+            </a:r>
+            <a:r>
+              <a:rPr lang="en-US" altLang="zh-TW" dirty="0" smtClean="0"/>
+              <a:t>:</a:t>
+            </a:r>
+            <a:r>
+              <a:rPr lang="zh-TW" altLang="en-US" dirty="0" smtClean="0"/>
+              <a:t> </a:t>
+            </a:r>
+            <a:r>
+              <a:rPr lang="en-US" altLang="zh-TW" dirty="0" smtClean="0"/>
+              <a:t>https://www.innova-systems.co.uk/green-arrows-solidworks-part-assembly-tree-icons-3d-interconnect/</a:t>
+            </a:r>
+            <a:endParaRPr lang="zh-TW" altLang="en-US" dirty="0"/>
+          </a:p>
+        </p:txBody>
+      </p:sp>
+      <p:sp>
+        <p:nvSpPr>
+          <p:cNvPr id="4" name="投影片編號版面配置區 3"/>
+          <p:cNvSpPr>
+            <a:spLocks noGrp="1"/>
+          </p:cNvSpPr>
+          <p:nvPr>
+            <p:ph type="sldNum" sz="quarter" idx="10"/>
+          </p:nvPr>
+        </p:nvSpPr>
+        <p:spPr/>
+        <p:txBody>
+          <a:bodyPr/>
+          <a:lstStyle/>
+          <a:p>
+            <a:fld id="{1CA6448E-ADE8-4A33-A8B5-C64CAD4ACB6C}" type="slidenum">
+              <a:rPr lang="zh-TW" altLang="en-US" smtClean="0"/>
+              <a:t>8</a:t>
+            </a:fld>
+            <a:endParaRPr lang="zh-TW" altLang="en-US"/>
+          </a:p>
+        </p:txBody>
+      </p:sp>
+    </p:spTree>
+    <p:extLst>
+      <p:ext uri="{BB962C8B-B14F-4D97-AF65-F5344CB8AC3E}">
+        <p14:creationId xmlns:p14="http://schemas.microsoft.com/office/powerpoint/2010/main" val="3805641502"/>
+      </p:ext>
+    </p:extLst>
+  </p:cSld>
+  <p:clrMapOvr>
+    <a:masterClrMapping/>
+  </p:clrMapOvr>
+</p:notes>
+</file>
+
+<file path=ppt/notesSlides/notesSlide2.xml><?xml version="1.0" encoding="utf-8"?>
+<p:notes xmlns:a="http://schemas.openxmlformats.org/drawingml/2006/main" xmlns:r="http://schemas.openxmlformats.org/officeDocument/2006/relationships" xmlns:p="http://schemas.openxmlformats.org/presentationml/2006/main">
+  <p:cSld>
+    <p:spTree>
+      <p:nvGrpSpPr>
+        <p:cNvPr id="1" name=""/>
+        <p:cNvGrpSpPr/>
+        <p:nvPr/>
+      </p:nvGrpSpPr>
+      <p:grpSpPr>
+        <a:xfrm>
+          <a:off x="0" y="0"/>
+          <a:ext cx="0" cy="0"/>
+          <a:chOff x="0" y="0"/>
+          <a:chExt cx="0" cy="0"/>
+        </a:xfrm>
+      </p:grpSpPr>
+      <p:sp>
+        <p:nvSpPr>
+          <p:cNvPr id="2" name="投影片圖像版面配置區 1"/>
+          <p:cNvSpPr>
+            <a:spLocks noGrp="1" noRot="1" noChangeAspect="1"/>
+          </p:cNvSpPr>
+          <p:nvPr>
+            <p:ph type="sldImg"/>
+          </p:nvPr>
+        </p:nvSpPr>
+        <p:spPr/>
+      </p:sp>
+      <p:sp>
+        <p:nvSpPr>
+          <p:cNvPr id="3" name="備忘稿版面配置區 2"/>
+          <p:cNvSpPr>
+            <a:spLocks noGrp="1"/>
+          </p:cNvSpPr>
+          <p:nvPr>
+            <p:ph type="body" idx="1"/>
+          </p:nvPr>
+        </p:nvSpPr>
+        <p:spPr/>
+        <p:txBody>
+          <a:bodyPr/>
+          <a:lstStyle/>
+          <a:p>
+            <a:endParaRPr lang="zh-TW" altLang="en-US" dirty="0"/>
+          </a:p>
+        </p:txBody>
+      </p:sp>
+      <p:sp>
+        <p:nvSpPr>
+          <p:cNvPr id="4" name="投影片編號版面配置區 3"/>
+          <p:cNvSpPr>
+            <a:spLocks noGrp="1"/>
+          </p:cNvSpPr>
+          <p:nvPr>
+            <p:ph type="sldNum" sz="quarter" idx="10"/>
+          </p:nvPr>
+        </p:nvSpPr>
+        <p:spPr/>
+        <p:txBody>
+          <a:bodyPr/>
+          <a:lstStyle/>
+          <a:p>
+            <a:fld id="{1CA6448E-ADE8-4A33-A8B5-C64CAD4ACB6C}" type="slidenum">
+              <a:rPr lang="zh-TW" altLang="en-US" smtClean="0"/>
+              <a:t>10</a:t>
+            </a:fld>
+            <a:endParaRPr lang="zh-TW" altLang="en-US"/>
+          </a:p>
+        </p:txBody>
+      </p:sp>
+    </p:spTree>
+    <p:extLst>
+      <p:ext uri="{BB962C8B-B14F-4D97-AF65-F5344CB8AC3E}">
+        <p14:creationId xmlns:p14="http://schemas.microsoft.com/office/powerpoint/2010/main" val="1932898494"/>
+      </p:ext>
+    </p:extLst>
+  </p:cSld>
+  <p:clrMapOvr>
+    <a:masterClrMapping/>
+  </p:clrMapOvr>
+</p:notes>
 </file>
 
 <file path=ppt/slideLayouts/slideLayout1.xml><?xml version="1.0" encoding="utf-8"?>
@@ -247,7 +849,7 @@
           <a:p>
             <a:fld id="{ABD390F2-37BD-4706-B110-6F28590CAA81}" type="datetimeFigureOut">
               <a:rPr lang="zh-TW" altLang="en-US" smtClean="0"/>
-              <a:t>2022/1/31</a:t>
+              <a:t>2022/2/7</a:t>
             </a:fld>
             <a:endParaRPr lang="zh-TW" altLang="en-US"/>
           </a:p>
@@ -417,7 +1019,7 @@
           <a:p>
             <a:fld id="{ABD390F2-37BD-4706-B110-6F28590CAA81}" type="datetimeFigureOut">
               <a:rPr lang="zh-TW" altLang="en-US" smtClean="0"/>
-              <a:t>2022/1/31</a:t>
+              <a:t>2022/2/7</a:t>
             </a:fld>
             <a:endParaRPr lang="zh-TW" altLang="en-US"/>
           </a:p>
@@ -597,7 +1199,7 @@
           <a:p>
             <a:fld id="{ABD390F2-37BD-4706-B110-6F28590CAA81}" type="datetimeFigureOut">
               <a:rPr lang="zh-TW" altLang="en-US" smtClean="0"/>
-              <a:t>2022/1/31</a:t>
+              <a:t>2022/2/7</a:t>
             </a:fld>
             <a:endParaRPr lang="zh-TW" altLang="en-US"/>
           </a:p>
@@ -767,7 +1369,7 @@
           <a:p>
             <a:fld id="{ABD390F2-37BD-4706-B110-6F28590CAA81}" type="datetimeFigureOut">
               <a:rPr lang="zh-TW" altLang="en-US" smtClean="0"/>
-              <a:t>2022/1/31</a:t>
+              <a:t>2022/2/7</a:t>
             </a:fld>
             <a:endParaRPr lang="zh-TW" altLang="en-US"/>
           </a:p>
@@ -1013,7 +1615,7 @@
           <a:p>
             <a:fld id="{ABD390F2-37BD-4706-B110-6F28590CAA81}" type="datetimeFigureOut">
               <a:rPr lang="zh-TW" altLang="en-US" smtClean="0"/>
-              <a:t>2022/1/31</a:t>
+              <a:t>2022/2/7</a:t>
             </a:fld>
             <a:endParaRPr lang="zh-TW" altLang="en-US"/>
           </a:p>
@@ -1245,7 +1847,7 @@
           <a:p>
             <a:fld id="{ABD390F2-37BD-4706-B110-6F28590CAA81}" type="datetimeFigureOut">
               <a:rPr lang="zh-TW" altLang="en-US" smtClean="0"/>
-              <a:t>2022/1/31</a:t>
+              <a:t>2022/2/7</a:t>
             </a:fld>
             <a:endParaRPr lang="zh-TW" altLang="en-US"/>
           </a:p>
@@ -1612,7 +2214,7 @@
           <a:p>
             <a:fld id="{ABD390F2-37BD-4706-B110-6F28590CAA81}" type="datetimeFigureOut">
               <a:rPr lang="zh-TW" altLang="en-US" smtClean="0"/>
-              <a:t>2022/1/31</a:t>
+              <a:t>2022/2/7</a:t>
             </a:fld>
             <a:endParaRPr lang="zh-TW" altLang="en-US"/>
           </a:p>
@@ -1730,7 +2332,7 @@
           <a:p>
             <a:fld id="{ABD390F2-37BD-4706-B110-6F28590CAA81}" type="datetimeFigureOut">
               <a:rPr lang="zh-TW" altLang="en-US" smtClean="0"/>
-              <a:t>2022/1/31</a:t>
+              <a:t>2022/2/7</a:t>
             </a:fld>
             <a:endParaRPr lang="zh-TW" altLang="en-US"/>
           </a:p>
@@ -1825,7 +2427,7 @@
           <a:p>
             <a:fld id="{ABD390F2-37BD-4706-B110-6F28590CAA81}" type="datetimeFigureOut">
               <a:rPr lang="zh-TW" altLang="en-US" smtClean="0"/>
-              <a:t>2022/1/31</a:t>
+              <a:t>2022/2/7</a:t>
             </a:fld>
             <a:endParaRPr lang="zh-TW" altLang="en-US"/>
           </a:p>
@@ -2102,7 +2704,7 @@
           <a:p>
             <a:fld id="{ABD390F2-37BD-4706-B110-6F28590CAA81}" type="datetimeFigureOut">
               <a:rPr lang="zh-TW" altLang="en-US" smtClean="0"/>
-              <a:t>2022/1/31</a:t>
+              <a:t>2022/2/7</a:t>
             </a:fld>
             <a:endParaRPr lang="zh-TW" altLang="en-US"/>
           </a:p>
@@ -2355,7 +2957,7 @@
           <a:p>
             <a:fld id="{ABD390F2-37BD-4706-B110-6F28590CAA81}" type="datetimeFigureOut">
               <a:rPr lang="zh-TW" altLang="en-US" smtClean="0"/>
-              <a:t>2022/1/31</a:t>
+              <a:t>2022/2/7</a:t>
             </a:fld>
             <a:endParaRPr lang="zh-TW" altLang="en-US"/>
           </a:p>
@@ -2568,7 +3170,7 @@
           <a:p>
             <a:fld id="{ABD390F2-37BD-4706-B110-6F28590CAA81}" type="datetimeFigureOut">
               <a:rPr lang="zh-TW" altLang="en-US" smtClean="0"/>
-              <a:t>2022/1/31</a:t>
+              <a:t>2022/2/7</a:t>
             </a:fld>
             <a:endParaRPr lang="zh-TW" altLang="en-US"/>
           </a:p>
@@ -2980,26 +3582,118 @@
             <a:spLocks noGrp="1"/>
           </p:cNvSpPr>
           <p:nvPr>
-            <p:ph type="ctrTitle"/>
-          </p:nvPr>
-        </p:nvSpPr>
-        <p:spPr/>
-        <p:txBody>
-          <a:bodyPr/>
-          <a:lstStyle/>
-          <a:p>
-            <a:endParaRPr lang="zh-TW" altLang="en-US"/>
-          </a:p>
-        </p:txBody>
-      </p:sp>
-      <p:sp>
-        <p:nvSpPr>
-          <p:cNvPr id="3" name="副標題 2"/>
-          <p:cNvSpPr>
-            <a:spLocks noGrp="1"/>
-          </p:cNvSpPr>
-          <p:nvPr>
-            <p:ph type="subTitle" idx="1"/>
+            <p:ph type="title"/>
+          </p:nvPr>
+        </p:nvSpPr>
+        <p:spPr/>
+        <p:txBody>
+          <a:bodyPr/>
+          <a:lstStyle/>
+          <a:p>
+            <a:r>
+              <a:rPr lang="en-US" altLang="zh-TW" dirty="0" smtClean="0"/>
+              <a:t>TODO</a:t>
+            </a:r>
+            <a:endParaRPr lang="zh-TW" altLang="en-US" dirty="0"/>
+          </a:p>
+        </p:txBody>
+      </p:sp>
+      <p:sp>
+        <p:nvSpPr>
+          <p:cNvPr id="3" name="內容版面配置區 2"/>
+          <p:cNvSpPr>
+            <a:spLocks noGrp="1"/>
+          </p:cNvSpPr>
+          <p:nvPr>
+            <p:ph idx="1"/>
+          </p:nvPr>
+        </p:nvSpPr>
+        <p:spPr/>
+        <p:txBody>
+          <a:bodyPr/>
+          <a:lstStyle/>
+          <a:p>
+            <a:r>
+              <a:rPr lang="en-US" altLang="zh-TW" dirty="0" smtClean="0"/>
+              <a:t>UPU0304</a:t>
+            </a:r>
+            <a:r>
+              <a:rPr lang="zh-TW" altLang="en-US" dirty="0" smtClean="0"/>
+              <a:t>跑過，檢查</a:t>
+            </a:r>
+            <a:r>
+              <a:rPr lang="en-US" altLang="zh-TW" dirty="0" smtClean="0"/>
+              <a:t>excel</a:t>
+            </a:r>
+            <a:r>
+              <a:rPr lang="zh-TW" altLang="en-US" dirty="0" smtClean="0"/>
+              <a:t>的</a:t>
+            </a:r>
+            <a:r>
+              <a:rPr lang="en-US" altLang="zh-TW" smtClean="0"/>
+              <a:t>MC</a:t>
+            </a:r>
+            <a:endParaRPr lang="zh-TW" altLang="en-US" dirty="0"/>
+          </a:p>
+        </p:txBody>
+      </p:sp>
+    </p:spTree>
+    <p:extLst>
+      <p:ext uri="{BB962C8B-B14F-4D97-AF65-F5344CB8AC3E}">
+        <p14:creationId xmlns:p14="http://schemas.microsoft.com/office/powerpoint/2010/main" val="3159380344"/>
+      </p:ext>
+    </p:extLst>
+  </p:cSld>
+  <p:clrMapOvr>
+    <a:masterClrMapping/>
+  </p:clrMapOvr>
+</p:sld>
+</file>
+
+<file path=ppt/slides/slide10.xml><?xml version="1.0" encoding="utf-8"?>
+<p:sld xmlns:a="http://schemas.openxmlformats.org/drawingml/2006/main" xmlns:r="http://schemas.openxmlformats.org/officeDocument/2006/relationships" xmlns:p="http://schemas.openxmlformats.org/presentationml/2006/main">
+  <p:cSld>
+    <p:spTree>
+      <p:nvGrpSpPr>
+        <p:cNvPr id="1" name=""/>
+        <p:cNvGrpSpPr/>
+        <p:nvPr/>
+      </p:nvGrpSpPr>
+      <p:grpSpPr>
+        <a:xfrm>
+          <a:off x="0" y="0"/>
+          <a:ext cx="0" cy="0"/>
+          <a:chOff x="0" y="0"/>
+          <a:chExt cx="0" cy="0"/>
+        </a:xfrm>
+      </p:grpSpPr>
+      <p:sp>
+        <p:nvSpPr>
+          <p:cNvPr id="2" name="標題 1"/>
+          <p:cNvSpPr>
+            <a:spLocks noGrp="1"/>
+          </p:cNvSpPr>
+          <p:nvPr>
+            <p:ph type="title"/>
+          </p:nvPr>
+        </p:nvSpPr>
+        <p:spPr/>
+        <p:txBody>
+          <a:bodyPr/>
+          <a:lstStyle/>
+          <a:p>
+            <a:endParaRPr lang="zh-TW" altLang="en-US"/>
+          </a:p>
+        </p:txBody>
+      </p:sp>
+      <p:sp>
+        <p:nvSpPr>
+          <p:cNvPr id="3" name="內容版面配置區 2"/>
+          <p:cNvSpPr>
+            <a:spLocks noGrp="1"/>
+          </p:cNvSpPr>
+          <p:nvPr>
+            <p:ph idx="1"/>
           </p:nvPr>
         </p:nvSpPr>
         <p:spPr/>
@@ -3020,6 +3714,183 @@
           <p:nvPr/>
         </p:nvPicPr>
         <p:blipFill>
+          <a:blip r:embed="rId3"/>
+          <a:stretch>
+            <a:fillRect/>
+          </a:stretch>
+        </p:blipFill>
+        <p:spPr>
+          <a:xfrm>
+            <a:off x="1" y="1"/>
+            <a:ext cx="12723920" cy="6858000"/>
+          </a:xfrm>
+          <a:prstGeom prst="rect">
+            <a:avLst/>
+          </a:prstGeom>
+        </p:spPr>
+      </p:pic>
+      <p:sp>
+        <p:nvSpPr>
+          <p:cNvPr id="5" name="文字方塊 4"/>
+          <p:cNvSpPr txBox="1"/>
+          <p:nvPr/>
+        </p:nvSpPr>
+        <p:spPr>
+          <a:xfrm>
+            <a:off x="371788" y="2522136"/>
+            <a:ext cx="2723823" cy="1477328"/>
+          </a:xfrm>
+          <a:prstGeom prst="rect">
+            <a:avLst/>
+          </a:prstGeom>
+          <a:noFill/>
+        </p:spPr>
+        <p:txBody>
+          <a:bodyPr wrap="none" rtlCol="0">
+            <a:spAutoFit/>
+          </a:bodyPr>
+          <a:lstStyle/>
+          <a:p>
+            <a:r>
+              <a:rPr lang="zh-TW" altLang="en-US" dirty="0" smtClean="0"/>
+              <a:t>錯誤訊息</a:t>
+            </a:r>
+            <a:endParaRPr lang="en-US" altLang="zh-TW" dirty="0" smtClean="0"/>
+          </a:p>
+          <a:p>
+            <a:r>
+              <a:rPr lang="zh-TW" altLang="en-US" dirty="0" smtClean="0"/>
+              <a:t>用戶</a:t>
+            </a:r>
+            <a:r>
+              <a:rPr lang="zh-TW" altLang="en-US" dirty="0"/>
+              <a:t>中斷</a:t>
+            </a:r>
+            <a:r>
+              <a:rPr lang="en-US" altLang="zh-TW" dirty="0" smtClean="0"/>
+              <a:t>COM</a:t>
+            </a:r>
+            <a:r>
+              <a:rPr lang="zh-TW" altLang="en-US" dirty="0"/>
+              <a:t>物件</a:t>
+            </a:r>
+            <a:r>
+              <a:rPr lang="zh-TW" altLang="en-US" dirty="0" smtClean="0"/>
+              <a:t>連線</a:t>
+            </a:r>
+            <a:endParaRPr lang="en-US" altLang="zh-TW" dirty="0" smtClean="0"/>
+          </a:p>
+          <a:p>
+            <a:endParaRPr lang="en-US" altLang="zh-TW" dirty="0" smtClean="0"/>
+          </a:p>
+          <a:p>
+            <a:r>
+              <a:rPr lang="zh-TW" altLang="en-US" dirty="0" smtClean="0"/>
+              <a:t>確認是此出問題，關閉了</a:t>
+            </a:r>
+            <a:endParaRPr lang="en-US" altLang="zh-TW" dirty="0" smtClean="0"/>
+          </a:p>
+          <a:p>
+            <a:r>
+              <a:rPr lang="zh-TW" altLang="en-US" dirty="0" smtClean="0"/>
+              <a:t>主文件</a:t>
+            </a:r>
+            <a:endParaRPr lang="en-US" altLang="zh-TW" dirty="0" smtClean="0"/>
+          </a:p>
+        </p:txBody>
+      </p:sp>
+      <p:pic>
+        <p:nvPicPr>
+          <p:cNvPr id="6" name="圖片 5"/>
+          <p:cNvPicPr>
+            <a:picLocks noChangeAspect="1"/>
+          </p:cNvPicPr>
+          <p:nvPr/>
+        </p:nvPicPr>
+        <p:blipFill>
+          <a:blip r:embed="rId4"/>
+          <a:stretch>
+            <a:fillRect/>
+          </a:stretch>
+        </p:blipFill>
+        <p:spPr>
+          <a:xfrm>
+            <a:off x="8755725" y="3686176"/>
+            <a:ext cx="3362325" cy="3171825"/>
+          </a:xfrm>
+          <a:prstGeom prst="rect">
+            <a:avLst/>
+          </a:prstGeom>
+        </p:spPr>
+      </p:pic>
+    </p:spTree>
+    <p:extLst>
+      <p:ext uri="{BB962C8B-B14F-4D97-AF65-F5344CB8AC3E}">
+        <p14:creationId xmlns:p14="http://schemas.microsoft.com/office/powerpoint/2010/main" val="3263591966"/>
+      </p:ext>
+    </p:extLst>
+  </p:cSld>
+  <p:clrMapOvr>
+    <a:masterClrMapping/>
+  </p:clrMapOvr>
+</p:sld>
+</file>
+
+<file path=ppt/slides/slide11.xml><?xml version="1.0" encoding="utf-8"?>
+<p:sld xmlns:a="http://schemas.openxmlformats.org/drawingml/2006/main" xmlns:r="http://schemas.openxmlformats.org/officeDocument/2006/relationships" xmlns:p="http://schemas.openxmlformats.org/presentationml/2006/main">
+  <p:cSld>
+    <p:spTree>
+      <p:nvGrpSpPr>
+        <p:cNvPr id="1" name=""/>
+        <p:cNvGrpSpPr/>
+        <p:nvPr/>
+      </p:nvGrpSpPr>
+      <p:grpSpPr>
+        <a:xfrm>
+          <a:off x="0" y="0"/>
+          <a:ext cx="0" cy="0"/>
+          <a:chOff x="0" y="0"/>
+          <a:chExt cx="0" cy="0"/>
+        </a:xfrm>
+      </p:grpSpPr>
+      <p:sp>
+        <p:nvSpPr>
+          <p:cNvPr id="2" name="標題 1"/>
+          <p:cNvSpPr>
+            <a:spLocks noGrp="1"/>
+          </p:cNvSpPr>
+          <p:nvPr>
+            <p:ph type="title"/>
+          </p:nvPr>
+        </p:nvSpPr>
+        <p:spPr/>
+        <p:txBody>
+          <a:bodyPr/>
+          <a:lstStyle/>
+          <a:p>
+            <a:r>
+              <a:rPr lang="en-US" altLang="zh-TW" dirty="0" smtClean="0"/>
+              <a:t>debug</a:t>
+            </a:r>
+            <a:r>
+              <a:rPr lang="zh-TW" altLang="en-US" dirty="0" smtClean="0"/>
+              <a:t>過程</a:t>
+            </a:r>
+            <a:endParaRPr lang="zh-TW" altLang="en-US" dirty="0"/>
+          </a:p>
+        </p:txBody>
+      </p:sp>
+      <p:pic>
+        <p:nvPicPr>
+          <p:cNvPr id="4" name="內容版面配置區 3"/>
+          <p:cNvPicPr>
+            <a:picLocks noGrp="1" noChangeAspect="1"/>
+          </p:cNvPicPr>
+          <p:nvPr>
+            <p:ph idx="1"/>
+          </p:nvPr>
+        </p:nvPicPr>
+        <p:blipFill>
           <a:blip r:embed="rId2"/>
           <a:stretch>
             <a:fillRect/>
@@ -3027,578 +3898,586 @@
         </p:blipFill>
         <p:spPr>
           <a:xfrm>
-            <a:off x="3600450" y="357187"/>
-            <a:ext cx="4991100" cy="6143625"/>
+            <a:off x="2245595" y="2245928"/>
+            <a:ext cx="7248525" cy="285750"/>
           </a:xfrm>
           <a:prstGeom prst="rect">
             <a:avLst/>
           </a:prstGeom>
         </p:spPr>
       </p:pic>
-      <p:sp>
-        <p:nvSpPr>
-          <p:cNvPr id="7" name="向右箭號 6"/>
-          <p:cNvSpPr/>
+      <p:pic>
+        <p:nvPicPr>
+          <p:cNvPr id="5" name="圖片 4"/>
+          <p:cNvPicPr>
+            <a:picLocks noChangeAspect="1"/>
+          </p:cNvPicPr>
           <p:nvPr/>
-        </p:nvSpPr>
+        </p:nvPicPr>
+        <p:blipFill>
+          <a:blip r:embed="rId3"/>
+          <a:stretch>
+            <a:fillRect/>
+          </a:stretch>
+        </p:blipFill>
         <p:spPr>
           <a:xfrm>
-            <a:off x="4084320" y="3022600"/>
-            <a:ext cx="264160" cy="142240"/>
+            <a:off x="1166812" y="2801168"/>
+            <a:ext cx="9858375" cy="285750"/>
           </a:xfrm>
-          <a:prstGeom prst="rightArrow">
+          <a:prstGeom prst="rect">
             <a:avLst/>
           </a:prstGeom>
         </p:spPr>
-        <p:style>
-          <a:lnRef idx="2">
-            <a:schemeClr val="accent1">
-              <a:shade val="50000"/>
-            </a:schemeClr>
-          </a:lnRef>
-          <a:fillRef idx="1">
-            <a:schemeClr val="accent1"/>
-          </a:fillRef>
-          <a:effectRef idx="0">
-            <a:schemeClr val="accent1"/>
-          </a:effectRef>
-          <a:fontRef idx="minor">
-            <a:schemeClr val="lt1"/>
-          </a:fontRef>
-        </p:style>
-        <p:txBody>
-          <a:bodyPr rtlCol="0" anchor="ctr"/>
-          <a:lstStyle/>
-          <a:p>
-            <a:pPr algn="ctr"/>
-            <a:endParaRPr lang="zh-TW" altLang="en-US"/>
-          </a:p>
-        </p:txBody>
-      </p:sp>
-      <p:sp>
-        <p:nvSpPr>
-          <p:cNvPr id="9" name="向右箭號 8"/>
-          <p:cNvSpPr/>
+      </p:pic>
+      <p:pic>
+        <p:nvPicPr>
+          <p:cNvPr id="6" name="圖片 5"/>
+          <p:cNvPicPr>
+            <a:picLocks noChangeAspect="1"/>
+          </p:cNvPicPr>
           <p:nvPr/>
-        </p:nvSpPr>
+        </p:nvPicPr>
+        <p:blipFill>
+          <a:blip r:embed="rId4"/>
+          <a:stretch>
+            <a:fillRect/>
+          </a:stretch>
+        </p:blipFill>
         <p:spPr>
           <a:xfrm>
-            <a:off x="4084320" y="2788285"/>
-            <a:ext cx="264160" cy="142240"/>
+            <a:off x="2157412" y="3286125"/>
+            <a:ext cx="7877175" cy="285750"/>
           </a:xfrm>
-          <a:prstGeom prst="rightArrow">
+          <a:prstGeom prst="rect">
             <a:avLst/>
           </a:prstGeom>
         </p:spPr>
-        <p:style>
-          <a:lnRef idx="2">
-            <a:schemeClr val="accent1">
-              <a:shade val="50000"/>
-            </a:schemeClr>
-          </a:lnRef>
-          <a:fillRef idx="1">
-            <a:schemeClr val="accent1"/>
-          </a:fillRef>
-          <a:effectRef idx="0">
-            <a:schemeClr val="accent1"/>
-          </a:effectRef>
-          <a:fontRef idx="minor">
-            <a:schemeClr val="lt1"/>
-          </a:fontRef>
-        </p:style>
-        <p:txBody>
-          <a:bodyPr rtlCol="0" anchor="ctr"/>
-          <a:lstStyle/>
-          <a:p>
-            <a:pPr algn="ctr"/>
-            <a:endParaRPr lang="zh-TW" altLang="en-US"/>
-          </a:p>
-        </p:txBody>
-      </p:sp>
-      <p:sp>
-        <p:nvSpPr>
-          <p:cNvPr id="10" name="向右箭號 9"/>
-          <p:cNvSpPr/>
+      </p:pic>
+      <p:pic>
+        <p:nvPicPr>
+          <p:cNvPr id="7" name="圖片 6"/>
+          <p:cNvPicPr>
+            <a:picLocks noChangeAspect="1"/>
+          </p:cNvPicPr>
           <p:nvPr/>
-        </p:nvSpPr>
+        </p:nvPicPr>
+        <p:blipFill>
+          <a:blip r:embed="rId5"/>
+          <a:stretch>
+            <a:fillRect/>
+          </a:stretch>
+        </p:blipFill>
         <p:spPr>
           <a:xfrm>
-            <a:off x="4079240" y="4846320"/>
-            <a:ext cx="264160" cy="142240"/>
+            <a:off x="2157412" y="3860029"/>
+            <a:ext cx="8010525" cy="285750"/>
           </a:xfrm>
-          <a:prstGeom prst="rightArrow">
+          <a:prstGeom prst="rect">
             <a:avLst/>
           </a:prstGeom>
         </p:spPr>
-        <p:style>
-          <a:lnRef idx="2">
-            <a:schemeClr val="accent1">
-              <a:shade val="50000"/>
-            </a:schemeClr>
-          </a:lnRef>
-          <a:fillRef idx="1">
-            <a:schemeClr val="accent1"/>
-          </a:fillRef>
-          <a:effectRef idx="0">
-            <a:schemeClr val="accent1"/>
-          </a:effectRef>
-          <a:fontRef idx="minor">
-            <a:schemeClr val="lt1"/>
-          </a:fontRef>
-        </p:style>
-        <p:txBody>
-          <a:bodyPr rtlCol="0" anchor="ctr"/>
-          <a:lstStyle/>
-          <a:p>
-            <a:pPr algn="ctr"/>
-            <a:endParaRPr lang="zh-TW" altLang="en-US"/>
-          </a:p>
-        </p:txBody>
-      </p:sp>
-      <p:sp>
-        <p:nvSpPr>
-          <p:cNvPr id="11" name="向右箭號 10"/>
-          <p:cNvSpPr/>
+      </p:pic>
+      <p:pic>
+        <p:nvPicPr>
+          <p:cNvPr id="8" name="圖片 7"/>
+          <p:cNvPicPr>
+            <a:picLocks noChangeAspect="1"/>
+          </p:cNvPicPr>
           <p:nvPr/>
-        </p:nvSpPr>
+        </p:nvPicPr>
+        <p:blipFill>
+          <a:blip r:embed="rId6"/>
+          <a:stretch>
+            <a:fillRect/>
+          </a:stretch>
+        </p:blipFill>
         <p:spPr>
           <a:xfrm>
-            <a:off x="4079240" y="1619727"/>
-            <a:ext cx="264160" cy="142240"/>
+            <a:off x="2157412" y="4616083"/>
+            <a:ext cx="8010525" cy="285750"/>
           </a:xfrm>
-          <a:prstGeom prst="rightArrow">
+          <a:prstGeom prst="rect">
             <a:avLst/>
           </a:prstGeom>
         </p:spPr>
-        <p:style>
-          <a:lnRef idx="2">
-            <a:schemeClr val="accent1">
-              <a:shade val="50000"/>
-            </a:schemeClr>
-          </a:lnRef>
-          <a:fillRef idx="1">
-            <a:schemeClr val="accent1"/>
-          </a:fillRef>
-          <a:effectRef idx="0">
-            <a:schemeClr val="accent1"/>
-          </a:effectRef>
-          <a:fontRef idx="minor">
-            <a:schemeClr val="lt1"/>
-          </a:fontRef>
-        </p:style>
-        <p:txBody>
-          <a:bodyPr rtlCol="0" anchor="ctr"/>
-          <a:lstStyle/>
-          <a:p>
-            <a:pPr algn="ctr"/>
-            <a:endParaRPr lang="zh-TW" altLang="en-US"/>
-          </a:p>
-        </p:txBody>
-      </p:sp>
-      <p:sp>
-        <p:nvSpPr>
-          <p:cNvPr id="12" name="向右箭號 11"/>
-          <p:cNvSpPr/>
+      </p:pic>
+      <p:pic>
+        <p:nvPicPr>
+          <p:cNvPr id="9" name="圖片 8"/>
+          <p:cNvPicPr>
+            <a:picLocks noChangeAspect="1"/>
+          </p:cNvPicPr>
           <p:nvPr/>
-        </p:nvSpPr>
+        </p:nvPicPr>
+        <p:blipFill>
+          <a:blip r:embed="rId7"/>
+          <a:stretch>
+            <a:fillRect/>
+          </a:stretch>
+        </p:blipFill>
         <p:spPr>
           <a:xfrm>
-            <a:off x="4084320" y="1884839"/>
-            <a:ext cx="264160" cy="142240"/>
+            <a:off x="2245594" y="5086387"/>
+            <a:ext cx="7248525" cy="285750"/>
           </a:xfrm>
-          <a:prstGeom prst="rightArrow">
+          <a:prstGeom prst="rect">
             <a:avLst/>
           </a:prstGeom>
         </p:spPr>
-        <p:style>
-          <a:lnRef idx="2">
-            <a:schemeClr val="accent1">
-              <a:shade val="50000"/>
-            </a:schemeClr>
-          </a:lnRef>
-          <a:fillRef idx="1">
-            <a:schemeClr val="accent1"/>
-          </a:fillRef>
-          <a:effectRef idx="0">
-            <a:schemeClr val="accent1"/>
-          </a:effectRef>
-          <a:fontRef idx="minor">
-            <a:schemeClr val="lt1"/>
-          </a:fontRef>
-        </p:style>
-        <p:txBody>
-          <a:bodyPr rtlCol="0" anchor="ctr"/>
-          <a:lstStyle/>
-          <a:p>
-            <a:pPr algn="ctr"/>
-            <a:endParaRPr lang="zh-TW" altLang="en-US"/>
-          </a:p>
-        </p:txBody>
-      </p:sp>
-      <p:sp>
-        <p:nvSpPr>
-          <p:cNvPr id="13" name="向右箭號 12"/>
-          <p:cNvSpPr/>
+      </p:pic>
+      <p:pic>
+        <p:nvPicPr>
+          <p:cNvPr id="10" name="圖片 9"/>
+          <p:cNvPicPr>
+            <a:picLocks noChangeAspect="1"/>
+          </p:cNvPicPr>
           <p:nvPr/>
-        </p:nvSpPr>
+        </p:nvPicPr>
+        <p:blipFill>
+          <a:blip r:embed="rId8"/>
+          <a:stretch>
+            <a:fillRect/>
+          </a:stretch>
+        </p:blipFill>
         <p:spPr>
           <a:xfrm>
-            <a:off x="4079240" y="2359026"/>
-            <a:ext cx="264160" cy="142240"/>
+            <a:off x="-77585" y="5970332"/>
+            <a:ext cx="12106275" cy="285750"/>
           </a:xfrm>
-          <a:prstGeom prst="rightArrow">
+          <a:prstGeom prst="rect">
             <a:avLst/>
           </a:prstGeom>
         </p:spPr>
-        <p:style>
-          <a:lnRef idx="2">
-            <a:schemeClr val="accent1">
-              <a:shade val="50000"/>
-            </a:schemeClr>
-          </a:lnRef>
-          <a:fillRef idx="1">
-            <a:schemeClr val="accent1"/>
-          </a:fillRef>
-          <a:effectRef idx="0">
-            <a:schemeClr val="accent1"/>
-          </a:effectRef>
-          <a:fontRef idx="minor">
-            <a:schemeClr val="lt1"/>
-          </a:fontRef>
-        </p:style>
-        <p:txBody>
-          <a:bodyPr rtlCol="0" anchor="ctr"/>
-          <a:lstStyle/>
-          <a:p>
-            <a:pPr algn="ctr"/>
-            <a:endParaRPr lang="zh-TW" altLang="en-US"/>
-          </a:p>
-        </p:txBody>
-      </p:sp>
-      <p:sp>
-        <p:nvSpPr>
-          <p:cNvPr id="14" name="向右箭號 13"/>
-          <p:cNvSpPr/>
-          <p:nvPr/>
-        </p:nvSpPr>
-        <p:spPr>
-          <a:xfrm>
-            <a:off x="4079240" y="2573655"/>
-            <a:ext cx="264160" cy="142240"/>
-          </a:xfrm>
-          <a:prstGeom prst="rightArrow">
-            <a:avLst/>
-          </a:prstGeom>
-        </p:spPr>
-        <p:style>
-          <a:lnRef idx="2">
-            <a:schemeClr val="accent1">
-              <a:shade val="50000"/>
-            </a:schemeClr>
-          </a:lnRef>
-          <a:fillRef idx="1">
-            <a:schemeClr val="accent1"/>
-          </a:fillRef>
-          <a:effectRef idx="0">
-            <a:schemeClr val="accent1"/>
-          </a:effectRef>
-          <a:fontRef idx="minor">
-            <a:schemeClr val="lt1"/>
-          </a:fontRef>
-        </p:style>
-        <p:txBody>
-          <a:bodyPr rtlCol="0" anchor="ctr"/>
-          <a:lstStyle/>
-          <a:p>
-            <a:pPr algn="ctr"/>
-            <a:endParaRPr lang="zh-TW" altLang="en-US"/>
-          </a:p>
-        </p:txBody>
-      </p:sp>
-      <p:sp>
-        <p:nvSpPr>
-          <p:cNvPr id="15" name="向右箭號 14"/>
-          <p:cNvSpPr/>
-          <p:nvPr/>
-        </p:nvSpPr>
-        <p:spPr>
-          <a:xfrm>
-            <a:off x="4079240" y="2097406"/>
-            <a:ext cx="264160" cy="142240"/>
-          </a:xfrm>
-          <a:prstGeom prst="rightArrow">
-            <a:avLst/>
-          </a:prstGeom>
-        </p:spPr>
-        <p:style>
-          <a:lnRef idx="2">
-            <a:schemeClr val="accent1">
-              <a:shade val="50000"/>
-            </a:schemeClr>
-          </a:lnRef>
-          <a:fillRef idx="1">
-            <a:schemeClr val="accent1"/>
-          </a:fillRef>
-          <a:effectRef idx="0">
-            <a:schemeClr val="accent1"/>
-          </a:effectRef>
-          <a:fontRef idx="minor">
-            <a:schemeClr val="lt1"/>
-          </a:fontRef>
-        </p:style>
-        <p:txBody>
-          <a:bodyPr rtlCol="0" anchor="ctr"/>
-          <a:lstStyle/>
-          <a:p>
-            <a:pPr algn="ctr"/>
-            <a:endParaRPr lang="zh-TW" altLang="en-US"/>
-          </a:p>
-        </p:txBody>
-      </p:sp>
-      <p:sp>
-        <p:nvSpPr>
-          <p:cNvPr id="16" name="向右箭號 15"/>
-          <p:cNvSpPr/>
-          <p:nvPr/>
-        </p:nvSpPr>
-        <p:spPr>
-          <a:xfrm>
-            <a:off x="4079240" y="5516880"/>
-            <a:ext cx="264160" cy="142240"/>
-          </a:xfrm>
-          <a:prstGeom prst="rightArrow">
-            <a:avLst/>
-          </a:prstGeom>
-        </p:spPr>
-        <p:style>
-          <a:lnRef idx="2">
-            <a:schemeClr val="accent1">
-              <a:shade val="50000"/>
-            </a:schemeClr>
-          </a:lnRef>
-          <a:fillRef idx="1">
-            <a:schemeClr val="accent1"/>
-          </a:fillRef>
-          <a:effectRef idx="0">
-            <a:schemeClr val="accent1"/>
-          </a:effectRef>
-          <a:fontRef idx="minor">
-            <a:schemeClr val="lt1"/>
-          </a:fontRef>
-        </p:style>
-        <p:txBody>
-          <a:bodyPr rtlCol="0" anchor="ctr"/>
-          <a:lstStyle/>
-          <a:p>
-            <a:pPr algn="ctr"/>
-            <a:endParaRPr lang="zh-TW" altLang="en-US"/>
-          </a:p>
-        </p:txBody>
-      </p:sp>
-      <p:sp>
-        <p:nvSpPr>
-          <p:cNvPr id="17" name="向右箭號 16"/>
-          <p:cNvSpPr/>
-          <p:nvPr/>
-        </p:nvSpPr>
-        <p:spPr>
-          <a:xfrm>
-            <a:off x="4079240" y="4394200"/>
-            <a:ext cx="264160" cy="142240"/>
-          </a:xfrm>
-          <a:prstGeom prst="rightArrow">
-            <a:avLst/>
-          </a:prstGeom>
-        </p:spPr>
-        <p:style>
-          <a:lnRef idx="2">
-            <a:schemeClr val="accent1">
-              <a:shade val="50000"/>
-            </a:schemeClr>
-          </a:lnRef>
-          <a:fillRef idx="1">
-            <a:schemeClr val="accent1"/>
-          </a:fillRef>
-          <a:effectRef idx="0">
-            <a:schemeClr val="accent1"/>
-          </a:effectRef>
-          <a:fontRef idx="minor">
-            <a:schemeClr val="lt1"/>
-          </a:fontRef>
-        </p:style>
-        <p:txBody>
-          <a:bodyPr rtlCol="0" anchor="ctr"/>
-          <a:lstStyle/>
-          <a:p>
-            <a:pPr algn="ctr"/>
-            <a:endParaRPr lang="zh-TW" altLang="en-US"/>
-          </a:p>
-        </p:txBody>
-      </p:sp>
-      <p:sp>
-        <p:nvSpPr>
-          <p:cNvPr id="18" name="向右箭號 17"/>
-          <p:cNvSpPr/>
-          <p:nvPr/>
-        </p:nvSpPr>
-        <p:spPr>
-          <a:xfrm>
-            <a:off x="4079240" y="4620260"/>
-            <a:ext cx="264160" cy="142240"/>
-          </a:xfrm>
-          <a:prstGeom prst="rightArrow">
-            <a:avLst/>
-          </a:prstGeom>
-        </p:spPr>
-        <p:style>
-          <a:lnRef idx="2">
-            <a:schemeClr val="accent1">
-              <a:shade val="50000"/>
-            </a:schemeClr>
-          </a:lnRef>
-          <a:fillRef idx="1">
-            <a:schemeClr val="accent1"/>
-          </a:fillRef>
-          <a:effectRef idx="0">
-            <a:schemeClr val="accent1"/>
-          </a:effectRef>
-          <a:fontRef idx="minor">
-            <a:schemeClr val="lt1"/>
-          </a:fontRef>
-        </p:style>
-        <p:txBody>
-          <a:bodyPr rtlCol="0" anchor="ctr"/>
-          <a:lstStyle/>
-          <a:p>
-            <a:pPr algn="ctr"/>
-            <a:endParaRPr lang="zh-TW" altLang="en-US"/>
-          </a:p>
-        </p:txBody>
-      </p:sp>
-      <p:sp>
-        <p:nvSpPr>
-          <p:cNvPr id="19" name="向右箭號 18"/>
-          <p:cNvSpPr/>
-          <p:nvPr/>
-        </p:nvSpPr>
-        <p:spPr>
-          <a:xfrm>
-            <a:off x="4079240" y="3946524"/>
-            <a:ext cx="264160" cy="142240"/>
-          </a:xfrm>
-          <a:prstGeom prst="rightArrow">
-            <a:avLst/>
-          </a:prstGeom>
-        </p:spPr>
-        <p:style>
-          <a:lnRef idx="2">
-            <a:schemeClr val="accent1">
-              <a:shade val="50000"/>
-            </a:schemeClr>
-          </a:lnRef>
-          <a:fillRef idx="1">
-            <a:schemeClr val="accent1"/>
-          </a:fillRef>
-          <a:effectRef idx="0">
-            <a:schemeClr val="accent1"/>
-          </a:effectRef>
-          <a:fontRef idx="minor">
-            <a:schemeClr val="lt1"/>
-          </a:fontRef>
-        </p:style>
-        <p:txBody>
-          <a:bodyPr rtlCol="0" anchor="ctr"/>
-          <a:lstStyle/>
-          <a:p>
-            <a:pPr algn="ctr"/>
-            <a:endParaRPr lang="zh-TW" altLang="en-US"/>
-          </a:p>
-        </p:txBody>
-      </p:sp>
-      <p:sp>
-        <p:nvSpPr>
-          <p:cNvPr id="20" name="向右箭號 19"/>
-          <p:cNvSpPr/>
-          <p:nvPr/>
-        </p:nvSpPr>
-        <p:spPr>
-          <a:xfrm>
-            <a:off x="4079240" y="3271838"/>
-            <a:ext cx="264160" cy="142240"/>
-          </a:xfrm>
-          <a:prstGeom prst="rightArrow">
-            <a:avLst/>
-          </a:prstGeom>
-        </p:spPr>
-        <p:style>
-          <a:lnRef idx="2">
-            <a:schemeClr val="accent1">
-              <a:shade val="50000"/>
-            </a:schemeClr>
-          </a:lnRef>
-          <a:fillRef idx="1">
-            <a:schemeClr val="accent1"/>
-          </a:fillRef>
-          <a:effectRef idx="0">
-            <a:schemeClr val="accent1"/>
-          </a:effectRef>
-          <a:fontRef idx="minor">
-            <a:schemeClr val="lt1"/>
-          </a:fontRef>
-        </p:style>
-        <p:txBody>
-          <a:bodyPr rtlCol="0" anchor="ctr"/>
-          <a:lstStyle/>
-          <a:p>
-            <a:pPr algn="ctr"/>
-            <a:endParaRPr lang="zh-TW" altLang="en-US"/>
-          </a:p>
-        </p:txBody>
-      </p:sp>
-      <p:sp>
-        <p:nvSpPr>
-          <p:cNvPr id="21" name="向右箭號 20"/>
-          <p:cNvSpPr/>
-          <p:nvPr/>
-        </p:nvSpPr>
-        <p:spPr>
-          <a:xfrm>
-            <a:off x="4079240" y="4193540"/>
-            <a:ext cx="264160" cy="142240"/>
-          </a:xfrm>
-          <a:prstGeom prst="rightArrow">
-            <a:avLst/>
-          </a:prstGeom>
-        </p:spPr>
-        <p:style>
-          <a:lnRef idx="2">
-            <a:schemeClr val="accent1">
-              <a:shade val="50000"/>
-            </a:schemeClr>
-          </a:lnRef>
-          <a:fillRef idx="1">
-            <a:schemeClr val="accent1"/>
-          </a:fillRef>
-          <a:effectRef idx="0">
-            <a:schemeClr val="accent1"/>
-          </a:effectRef>
-          <a:fontRef idx="minor">
-            <a:schemeClr val="lt1"/>
-          </a:fontRef>
-        </p:style>
-        <p:txBody>
-          <a:bodyPr rtlCol="0" anchor="ctr"/>
-          <a:lstStyle/>
-          <a:p>
-            <a:pPr algn="ctr"/>
-            <a:endParaRPr lang="zh-TW" altLang="en-US"/>
-          </a:p>
-        </p:txBody>
-      </p:sp>
+      </p:pic>
     </p:spTree>
     <p:extLst>
       <p:ext uri="{BB962C8B-B14F-4D97-AF65-F5344CB8AC3E}">
-        <p14:creationId xmlns:p14="http://schemas.microsoft.com/office/powerpoint/2010/main" val="2770107614"/>
+        <p14:creationId xmlns:p14="http://schemas.microsoft.com/office/powerpoint/2010/main" val="771779644"/>
+      </p:ext>
+    </p:extLst>
+  </p:cSld>
+  <p:clrMapOvr>
+    <a:masterClrMapping/>
+  </p:clrMapOvr>
+</p:sld>
+</file>
+
+<file path=ppt/slides/slide12.xml><?xml version="1.0" encoding="utf-8"?>
+<p:sld xmlns:a="http://schemas.openxmlformats.org/drawingml/2006/main" xmlns:r="http://schemas.openxmlformats.org/officeDocument/2006/relationships" xmlns:p="http://schemas.openxmlformats.org/presentationml/2006/main">
+  <p:cSld>
+    <p:spTree>
+      <p:nvGrpSpPr>
+        <p:cNvPr id="1" name=""/>
+        <p:cNvGrpSpPr/>
+        <p:nvPr/>
+      </p:nvGrpSpPr>
+      <p:grpSpPr>
+        <a:xfrm>
+          <a:off x="0" y="0"/>
+          <a:ext cx="0" cy="0"/>
+          <a:chOff x="0" y="0"/>
+          <a:chExt cx="0" cy="0"/>
+        </a:xfrm>
+      </p:grpSpPr>
+      <p:sp>
+        <p:nvSpPr>
+          <p:cNvPr id="2" name="標題 1"/>
+          <p:cNvSpPr>
+            <a:spLocks noGrp="1"/>
+          </p:cNvSpPr>
+          <p:nvPr>
+            <p:ph type="title"/>
+          </p:nvPr>
+        </p:nvSpPr>
+        <p:spPr/>
+        <p:txBody>
+          <a:bodyPr/>
+          <a:lstStyle/>
+          <a:p>
+            <a:endParaRPr lang="zh-TW" altLang="en-US"/>
+          </a:p>
+        </p:txBody>
+      </p:sp>
+      <p:sp>
+        <p:nvSpPr>
+          <p:cNvPr id="3" name="內容版面配置區 2"/>
+          <p:cNvSpPr>
+            <a:spLocks noGrp="1"/>
+          </p:cNvSpPr>
+          <p:nvPr>
+            <p:ph idx="1"/>
+          </p:nvPr>
+        </p:nvSpPr>
+        <p:spPr/>
+        <p:txBody>
+          <a:bodyPr/>
+          <a:lstStyle/>
+          <a:p>
+            <a:endParaRPr lang="zh-TW" altLang="en-US"/>
+          </a:p>
+        </p:txBody>
+      </p:sp>
+    </p:spTree>
+    <p:extLst>
+      <p:ext uri="{BB962C8B-B14F-4D97-AF65-F5344CB8AC3E}">
+        <p14:creationId xmlns:p14="http://schemas.microsoft.com/office/powerpoint/2010/main" val="339874688"/>
+      </p:ext>
+    </p:extLst>
+  </p:cSld>
+  <p:clrMapOvr>
+    <a:masterClrMapping/>
+  </p:clrMapOvr>
+</p:sld>
+</file>
+
+<file path=ppt/slides/slide13.xml><?xml version="1.0" encoding="utf-8"?>
+<p:sld xmlns:a="http://schemas.openxmlformats.org/drawingml/2006/main" xmlns:r="http://schemas.openxmlformats.org/officeDocument/2006/relationships" xmlns:p="http://schemas.openxmlformats.org/presentationml/2006/main">
+  <p:cSld>
+    <p:spTree>
+      <p:nvGrpSpPr>
+        <p:cNvPr id="1" name=""/>
+        <p:cNvGrpSpPr/>
+        <p:nvPr/>
+      </p:nvGrpSpPr>
+      <p:grpSpPr>
+        <a:xfrm>
+          <a:off x="0" y="0"/>
+          <a:ext cx="0" cy="0"/>
+          <a:chOff x="0" y="0"/>
+          <a:chExt cx="0" cy="0"/>
+        </a:xfrm>
+      </p:grpSpPr>
+      <p:sp>
+        <p:nvSpPr>
+          <p:cNvPr id="2" name="標題 1"/>
+          <p:cNvSpPr>
+            <a:spLocks noGrp="1"/>
+          </p:cNvSpPr>
+          <p:nvPr>
+            <p:ph type="title"/>
+          </p:nvPr>
+        </p:nvSpPr>
+        <p:spPr/>
+        <p:txBody>
+          <a:bodyPr/>
+          <a:lstStyle/>
+          <a:p>
+            <a:endParaRPr lang="zh-TW" altLang="en-US"/>
+          </a:p>
+        </p:txBody>
+      </p:sp>
+      <p:sp>
+        <p:nvSpPr>
+          <p:cNvPr id="3" name="內容版面配置區 2"/>
+          <p:cNvSpPr>
+            <a:spLocks noGrp="1"/>
+          </p:cNvSpPr>
+          <p:nvPr>
+            <p:ph idx="1"/>
+          </p:nvPr>
+        </p:nvSpPr>
+        <p:spPr/>
+        <p:txBody>
+          <a:bodyPr/>
+          <a:lstStyle/>
+          <a:p>
+            <a:endParaRPr lang="zh-TW" altLang="en-US"/>
+          </a:p>
+        </p:txBody>
+      </p:sp>
+    </p:spTree>
+    <p:extLst>
+      <p:ext uri="{BB962C8B-B14F-4D97-AF65-F5344CB8AC3E}">
+        <p14:creationId xmlns:p14="http://schemas.microsoft.com/office/powerpoint/2010/main" val="3285241801"/>
+      </p:ext>
+    </p:extLst>
+  </p:cSld>
+  <p:clrMapOvr>
+    <a:masterClrMapping/>
+  </p:clrMapOvr>
+</p:sld>
+</file>
+
+<file path=ppt/slides/slide14.xml><?xml version="1.0" encoding="utf-8"?>
+<p:sld xmlns:a="http://schemas.openxmlformats.org/drawingml/2006/main" xmlns:r="http://schemas.openxmlformats.org/officeDocument/2006/relationships" xmlns:p="http://schemas.openxmlformats.org/presentationml/2006/main">
+  <p:cSld>
+    <p:spTree>
+      <p:nvGrpSpPr>
+        <p:cNvPr id="1" name=""/>
+        <p:cNvGrpSpPr/>
+        <p:nvPr/>
+      </p:nvGrpSpPr>
+      <p:grpSpPr>
+        <a:xfrm>
+          <a:off x="0" y="0"/>
+          <a:ext cx="0" cy="0"/>
+          <a:chOff x="0" y="0"/>
+          <a:chExt cx="0" cy="0"/>
+        </a:xfrm>
+      </p:grpSpPr>
+      <p:sp>
+        <p:nvSpPr>
+          <p:cNvPr id="2" name="標題 1"/>
+          <p:cNvSpPr>
+            <a:spLocks noGrp="1"/>
+          </p:cNvSpPr>
+          <p:nvPr>
+            <p:ph type="title"/>
+          </p:nvPr>
+        </p:nvSpPr>
+        <p:spPr/>
+        <p:txBody>
+          <a:bodyPr/>
+          <a:lstStyle/>
+          <a:p>
+            <a:endParaRPr lang="zh-TW" altLang="en-US"/>
+          </a:p>
+        </p:txBody>
+      </p:sp>
+      <p:sp>
+        <p:nvSpPr>
+          <p:cNvPr id="3" name="內容版面配置區 2"/>
+          <p:cNvSpPr>
+            <a:spLocks noGrp="1"/>
+          </p:cNvSpPr>
+          <p:nvPr>
+            <p:ph idx="1"/>
+          </p:nvPr>
+        </p:nvSpPr>
+        <p:spPr/>
+        <p:txBody>
+          <a:bodyPr/>
+          <a:lstStyle/>
+          <a:p>
+            <a:endParaRPr lang="zh-TW" altLang="en-US"/>
+          </a:p>
+        </p:txBody>
+      </p:sp>
+    </p:spTree>
+    <p:extLst>
+      <p:ext uri="{BB962C8B-B14F-4D97-AF65-F5344CB8AC3E}">
+        <p14:creationId xmlns:p14="http://schemas.microsoft.com/office/powerpoint/2010/main" val="281661071"/>
+      </p:ext>
+    </p:extLst>
+  </p:cSld>
+  <p:clrMapOvr>
+    <a:masterClrMapping/>
+  </p:clrMapOvr>
+</p:sld>
+</file>
+
+<file path=ppt/slides/slide15.xml><?xml version="1.0" encoding="utf-8"?>
+<p:sld xmlns:a="http://schemas.openxmlformats.org/drawingml/2006/main" xmlns:r="http://schemas.openxmlformats.org/officeDocument/2006/relationships" xmlns:p="http://schemas.openxmlformats.org/presentationml/2006/main">
+  <p:cSld>
+    <p:spTree>
+      <p:nvGrpSpPr>
+        <p:cNvPr id="1" name=""/>
+        <p:cNvGrpSpPr/>
+        <p:nvPr/>
+      </p:nvGrpSpPr>
+      <p:grpSpPr>
+        <a:xfrm>
+          <a:off x="0" y="0"/>
+          <a:ext cx="0" cy="0"/>
+          <a:chOff x="0" y="0"/>
+          <a:chExt cx="0" cy="0"/>
+        </a:xfrm>
+      </p:grpSpPr>
+      <p:sp>
+        <p:nvSpPr>
+          <p:cNvPr id="2" name="標題 1"/>
+          <p:cNvSpPr>
+            <a:spLocks noGrp="1"/>
+          </p:cNvSpPr>
+          <p:nvPr>
+            <p:ph type="title"/>
+          </p:nvPr>
+        </p:nvSpPr>
+        <p:spPr/>
+        <p:txBody>
+          <a:bodyPr/>
+          <a:lstStyle/>
+          <a:p>
+            <a:endParaRPr lang="zh-TW" altLang="en-US"/>
+          </a:p>
+        </p:txBody>
+      </p:sp>
+      <p:sp>
+        <p:nvSpPr>
+          <p:cNvPr id="3" name="內容版面配置區 2"/>
+          <p:cNvSpPr>
+            <a:spLocks noGrp="1"/>
+          </p:cNvSpPr>
+          <p:nvPr>
+            <p:ph idx="1"/>
+          </p:nvPr>
+        </p:nvSpPr>
+        <p:spPr/>
+        <p:txBody>
+          <a:bodyPr/>
+          <a:lstStyle/>
+          <a:p>
+            <a:endParaRPr lang="zh-TW" altLang="en-US"/>
+          </a:p>
+        </p:txBody>
+      </p:sp>
+    </p:spTree>
+    <p:extLst>
+      <p:ext uri="{BB962C8B-B14F-4D97-AF65-F5344CB8AC3E}">
+        <p14:creationId xmlns:p14="http://schemas.microsoft.com/office/powerpoint/2010/main" val="2571617641"/>
+      </p:ext>
+    </p:extLst>
+  </p:cSld>
+  <p:clrMapOvr>
+    <a:masterClrMapping/>
+  </p:clrMapOvr>
+</p:sld>
+</file>
+
+<file path=ppt/slides/slide16.xml><?xml version="1.0" encoding="utf-8"?>
+<p:sld xmlns:a="http://schemas.openxmlformats.org/drawingml/2006/main" xmlns:r="http://schemas.openxmlformats.org/officeDocument/2006/relationships" xmlns:p="http://schemas.openxmlformats.org/presentationml/2006/main">
+  <p:cSld>
+    <p:spTree>
+      <p:nvGrpSpPr>
+        <p:cNvPr id="1" name=""/>
+        <p:cNvGrpSpPr/>
+        <p:nvPr/>
+      </p:nvGrpSpPr>
+      <p:grpSpPr>
+        <a:xfrm>
+          <a:off x="0" y="0"/>
+          <a:ext cx="0" cy="0"/>
+          <a:chOff x="0" y="0"/>
+          <a:chExt cx="0" cy="0"/>
+        </a:xfrm>
+      </p:grpSpPr>
+      <p:sp>
+        <p:nvSpPr>
+          <p:cNvPr id="2" name="標題 1"/>
+          <p:cNvSpPr>
+            <a:spLocks noGrp="1"/>
+          </p:cNvSpPr>
+          <p:nvPr>
+            <p:ph type="title"/>
+          </p:nvPr>
+        </p:nvSpPr>
+        <p:spPr/>
+        <p:txBody>
+          <a:bodyPr/>
+          <a:lstStyle/>
+          <a:p>
+            <a:endParaRPr lang="zh-TW" altLang="en-US"/>
+          </a:p>
+        </p:txBody>
+      </p:sp>
+      <p:sp>
+        <p:nvSpPr>
+          <p:cNvPr id="3" name="內容版面配置區 2"/>
+          <p:cNvSpPr>
+            <a:spLocks noGrp="1"/>
+          </p:cNvSpPr>
+          <p:nvPr>
+            <p:ph idx="1"/>
+          </p:nvPr>
+        </p:nvSpPr>
+        <p:spPr/>
+        <p:txBody>
+          <a:bodyPr/>
+          <a:lstStyle/>
+          <a:p>
+            <a:endParaRPr lang="zh-TW" altLang="en-US"/>
+          </a:p>
+        </p:txBody>
+      </p:sp>
+    </p:spTree>
+    <p:extLst>
+      <p:ext uri="{BB962C8B-B14F-4D97-AF65-F5344CB8AC3E}">
+        <p14:creationId xmlns:p14="http://schemas.microsoft.com/office/powerpoint/2010/main" val="1621598414"/>
+      </p:ext>
+    </p:extLst>
+  </p:cSld>
+  <p:clrMapOvr>
+    <a:masterClrMapping/>
+  </p:clrMapOvr>
+</p:sld>
+</file>
+
+<file path=ppt/slides/slide17.xml><?xml version="1.0" encoding="utf-8"?>
+<p:sld xmlns:a="http://schemas.openxmlformats.org/drawingml/2006/main" xmlns:r="http://schemas.openxmlformats.org/officeDocument/2006/relationships" xmlns:p="http://schemas.openxmlformats.org/presentationml/2006/main">
+  <p:cSld>
+    <p:spTree>
+      <p:nvGrpSpPr>
+        <p:cNvPr id="1" name=""/>
+        <p:cNvGrpSpPr/>
+        <p:nvPr/>
+      </p:nvGrpSpPr>
+      <p:grpSpPr>
+        <a:xfrm>
+          <a:off x="0" y="0"/>
+          <a:ext cx="0" cy="0"/>
+          <a:chOff x="0" y="0"/>
+          <a:chExt cx="0" cy="0"/>
+        </a:xfrm>
+      </p:grpSpPr>
+      <p:sp>
+        <p:nvSpPr>
+          <p:cNvPr id="2" name="標題 1"/>
+          <p:cNvSpPr>
+            <a:spLocks noGrp="1"/>
+          </p:cNvSpPr>
+          <p:nvPr>
+            <p:ph type="title"/>
+          </p:nvPr>
+        </p:nvSpPr>
+        <p:spPr/>
+        <p:txBody>
+          <a:bodyPr/>
+          <a:lstStyle/>
+          <a:p>
+            <a:r>
+              <a:rPr lang="zh-TW" altLang="en-US" dirty="0" smtClean="0"/>
+              <a:t>參考資料</a:t>
+            </a:r>
+            <a:endParaRPr lang="zh-TW" altLang="en-US" dirty="0"/>
+          </a:p>
+        </p:txBody>
+      </p:sp>
+      <p:sp>
+        <p:nvSpPr>
+          <p:cNvPr id="3" name="內容版面配置區 2"/>
+          <p:cNvSpPr>
+            <a:spLocks noGrp="1"/>
+          </p:cNvSpPr>
+          <p:nvPr>
+            <p:ph idx="1"/>
+          </p:nvPr>
+        </p:nvSpPr>
+        <p:spPr/>
+        <p:txBody>
+          <a:bodyPr/>
+          <a:lstStyle/>
+          <a:p>
+            <a:r>
+              <a:rPr lang="zh-TW" altLang="en-US" dirty="0" smtClean="0"/>
+              <a:t>零組件圖示</a:t>
+            </a:r>
+            <a:endParaRPr lang="en-US" altLang="zh-TW" dirty="0" smtClean="0"/>
+          </a:p>
+          <a:p>
+            <a:pPr lvl="1"/>
+            <a:r>
+              <a:rPr lang="en-US" altLang="zh-TW" dirty="0"/>
+              <a:t>https://help.solidworks.com/2019/chinese/solidworks/sldworks/c_component_icons_fmdt.htm</a:t>
+            </a:r>
+            <a:endParaRPr lang="zh-TW" altLang="en-US" dirty="0"/>
+          </a:p>
+        </p:txBody>
+      </p:sp>
+    </p:spTree>
+    <p:extLst>
+      <p:ext uri="{BB962C8B-B14F-4D97-AF65-F5344CB8AC3E}">
+        <p14:creationId xmlns:p14="http://schemas.microsoft.com/office/powerpoint/2010/main" val="24769793"/>
       </p:ext>
     </p:extLst>
   </p:cSld>
@@ -3632,55 +4511,74 @@
             <a:spLocks noGrp="1"/>
           </p:cNvSpPr>
           <p:nvPr>
-            <p:ph type="ctrTitle"/>
-          </p:nvPr>
-        </p:nvSpPr>
-        <p:spPr/>
-        <p:txBody>
-          <a:bodyPr/>
-          <a:lstStyle/>
-          <a:p>
-            <a:endParaRPr lang="zh-TW" altLang="en-US"/>
-          </a:p>
-        </p:txBody>
-      </p:sp>
-      <p:sp>
-        <p:nvSpPr>
-          <p:cNvPr id="3" name="副標題 2"/>
-          <p:cNvSpPr>
-            <a:spLocks noGrp="1"/>
-          </p:cNvSpPr>
-          <p:nvPr>
-            <p:ph type="subTitle" idx="1"/>
-          </p:nvPr>
-        </p:nvSpPr>
-        <p:spPr/>
-        <p:txBody>
-          <a:bodyPr/>
-          <a:lstStyle/>
-          <a:p>
-            <a:endParaRPr lang="zh-TW" altLang="en-US"/>
+            <p:ph type="title"/>
+          </p:nvPr>
+        </p:nvSpPr>
+        <p:spPr/>
+        <p:txBody>
+          <a:bodyPr/>
+          <a:lstStyle/>
+          <a:p>
+            <a:r>
+              <a:rPr lang="en-US" altLang="zh-TW" dirty="0" smtClean="0"/>
+              <a:t>UPU0304</a:t>
+            </a:r>
+            <a:r>
+              <a:rPr lang="zh-TW" altLang="en-US" dirty="0" smtClean="0"/>
+              <a:t>中的次組合件</a:t>
+            </a:r>
+            <a:r>
+              <a:rPr lang="en-US" altLang="zh-TW" dirty="0" smtClean="0"/>
+              <a:t>(</a:t>
+            </a:r>
+            <a:r>
+              <a:rPr lang="zh-TW" altLang="en-US" dirty="0" smtClean="0"/>
+              <a:t>藍色箭頭表示通過測試</a:t>
+            </a:r>
+            <a:r>
+              <a:rPr lang="en-US" altLang="zh-TW" dirty="0" smtClean="0"/>
+              <a:t>)</a:t>
+            </a:r>
+            <a:endParaRPr lang="zh-TW" altLang="en-US" dirty="0"/>
+          </a:p>
+        </p:txBody>
+      </p:sp>
+      <p:sp>
+        <p:nvSpPr>
+          <p:cNvPr id="5" name="內容版面配置區 4"/>
+          <p:cNvSpPr>
+            <a:spLocks noGrp="1"/>
+          </p:cNvSpPr>
+          <p:nvPr>
+            <p:ph idx="1"/>
+          </p:nvPr>
+        </p:nvSpPr>
+        <p:spPr/>
+        <p:txBody>
+          <a:bodyPr/>
+          <a:lstStyle/>
+          <a:p>
+            <a:endParaRPr lang="zh-TW" altLang="en-US" dirty="0"/>
           </a:p>
         </p:txBody>
       </p:sp>
       <p:pic>
         <p:nvPicPr>
-          <p:cNvPr id="4" name="圖片 3"/>
+          <p:cNvPr id="6" name="圖片 5"/>
           <p:cNvPicPr>
             <a:picLocks noChangeAspect="1"/>
           </p:cNvPicPr>
           <p:nvPr/>
         </p:nvPicPr>
-        <p:blipFill>
+        <p:blipFill rotWithShape="1">
           <a:blip r:embed="rId2"/>
-          <a:stretch>
-            <a:fillRect/>
-          </a:stretch>
+          <a:srcRect b="24662"/>
+          <a:stretch/>
         </p:blipFill>
         <p:spPr>
           <a:xfrm>
-            <a:off x="3905250" y="342265"/>
-            <a:ext cx="4991100" cy="6143625"/>
+            <a:off x="1096297" y="1690688"/>
+            <a:ext cx="10386677" cy="4833682"/>
           </a:xfrm>
           <a:prstGeom prst="rect">
             <a:avLst/>
@@ -3695,8 +4593,8 @@
         </p:nvSpPr>
         <p:spPr>
           <a:xfrm>
-            <a:off x="4343400" y="3036570"/>
-            <a:ext cx="264160" cy="142240"/>
+            <a:off x="1096297" y="2241755"/>
+            <a:ext cx="258097" cy="98322"/>
           </a:xfrm>
           <a:prstGeom prst="rightArrow">
             <a:avLst/>
@@ -3729,14 +4627,14 @@
       </p:sp>
       <p:sp>
         <p:nvSpPr>
-          <p:cNvPr id="9" name="向右箭號 8"/>
+          <p:cNvPr id="8" name="向右箭號 7"/>
           <p:cNvSpPr/>
           <p:nvPr/>
         </p:nvSpPr>
         <p:spPr>
           <a:xfrm>
-            <a:off x="4343400" y="2799715"/>
-            <a:ext cx="264160" cy="142240"/>
+            <a:off x="1096296" y="4451555"/>
+            <a:ext cx="258097" cy="98322"/>
           </a:xfrm>
           <a:prstGeom prst="rightArrow">
             <a:avLst/>
@@ -3769,14 +4667,14 @@
       </p:sp>
       <p:sp>
         <p:nvSpPr>
-          <p:cNvPr id="10" name="向右箭號 9"/>
+          <p:cNvPr id="9" name="向右箭號 8"/>
           <p:cNvSpPr/>
           <p:nvPr/>
         </p:nvSpPr>
         <p:spPr>
           <a:xfrm>
-            <a:off x="4343400" y="4854575"/>
-            <a:ext cx="264160" cy="142240"/>
+            <a:off x="1096296" y="2598944"/>
+            <a:ext cx="258097" cy="98322"/>
           </a:xfrm>
           <a:prstGeom prst="rightArrow">
             <a:avLst/>
@@ -3807,450 +4705,10 @@
           </a:p>
         </p:txBody>
       </p:sp>
-      <p:sp>
-        <p:nvSpPr>
-          <p:cNvPr id="11" name="向右箭號 10"/>
-          <p:cNvSpPr/>
-          <p:nvPr/>
-        </p:nvSpPr>
-        <p:spPr>
-          <a:xfrm>
-            <a:off x="4378960" y="1666240"/>
-            <a:ext cx="264160" cy="142240"/>
-          </a:xfrm>
-          <a:prstGeom prst="rightArrow">
-            <a:avLst/>
-          </a:prstGeom>
-        </p:spPr>
-        <p:style>
-          <a:lnRef idx="2">
-            <a:schemeClr val="accent1">
-              <a:shade val="50000"/>
-            </a:schemeClr>
-          </a:lnRef>
-          <a:fillRef idx="1">
-            <a:schemeClr val="accent1"/>
-          </a:fillRef>
-          <a:effectRef idx="0">
-            <a:schemeClr val="accent1"/>
-          </a:effectRef>
-          <a:fontRef idx="minor">
-            <a:schemeClr val="lt1"/>
-          </a:fontRef>
-        </p:style>
-        <p:txBody>
-          <a:bodyPr rtlCol="0" anchor="ctr"/>
-          <a:lstStyle/>
-          <a:p>
-            <a:pPr algn="ctr"/>
-            <a:endParaRPr lang="zh-TW" altLang="en-US"/>
-          </a:p>
-        </p:txBody>
-      </p:sp>
-      <p:sp>
-        <p:nvSpPr>
-          <p:cNvPr id="12" name="向右箭號 11"/>
-          <p:cNvSpPr/>
-          <p:nvPr/>
-        </p:nvSpPr>
-        <p:spPr>
-          <a:xfrm>
-            <a:off x="4343400" y="1909129"/>
-            <a:ext cx="264160" cy="142240"/>
-          </a:xfrm>
-          <a:prstGeom prst="rightArrow">
-            <a:avLst/>
-          </a:prstGeom>
-        </p:spPr>
-        <p:style>
-          <a:lnRef idx="2">
-            <a:schemeClr val="accent1">
-              <a:shade val="50000"/>
-            </a:schemeClr>
-          </a:lnRef>
-          <a:fillRef idx="1">
-            <a:schemeClr val="accent1"/>
-          </a:fillRef>
-          <a:effectRef idx="0">
-            <a:schemeClr val="accent1"/>
-          </a:effectRef>
-          <a:fontRef idx="minor">
-            <a:schemeClr val="lt1"/>
-          </a:fontRef>
-        </p:style>
-        <p:txBody>
-          <a:bodyPr rtlCol="0" anchor="ctr"/>
-          <a:lstStyle/>
-          <a:p>
-            <a:pPr algn="ctr"/>
-            <a:endParaRPr lang="zh-TW" altLang="en-US"/>
-          </a:p>
-        </p:txBody>
-      </p:sp>
-      <p:sp>
-        <p:nvSpPr>
-          <p:cNvPr id="13" name="向右箭號 12"/>
-          <p:cNvSpPr/>
-          <p:nvPr/>
-        </p:nvSpPr>
-        <p:spPr>
-          <a:xfrm>
-            <a:off x="4371340" y="2345216"/>
-            <a:ext cx="264160" cy="142240"/>
-          </a:xfrm>
-          <a:prstGeom prst="rightArrow">
-            <a:avLst/>
-          </a:prstGeom>
-        </p:spPr>
-        <p:style>
-          <a:lnRef idx="2">
-            <a:schemeClr val="accent1">
-              <a:shade val="50000"/>
-            </a:schemeClr>
-          </a:lnRef>
-          <a:fillRef idx="1">
-            <a:schemeClr val="accent1"/>
-          </a:fillRef>
-          <a:effectRef idx="0">
-            <a:schemeClr val="accent1"/>
-          </a:effectRef>
-          <a:fontRef idx="minor">
-            <a:schemeClr val="lt1"/>
-          </a:fontRef>
-        </p:style>
-        <p:txBody>
-          <a:bodyPr rtlCol="0" anchor="ctr"/>
-          <a:lstStyle/>
-          <a:p>
-            <a:pPr algn="ctr"/>
-            <a:endParaRPr lang="zh-TW" altLang="en-US"/>
-          </a:p>
-        </p:txBody>
-      </p:sp>
-      <p:sp>
-        <p:nvSpPr>
-          <p:cNvPr id="14" name="向右箭號 13"/>
-          <p:cNvSpPr/>
-          <p:nvPr/>
-        </p:nvSpPr>
-        <p:spPr>
-          <a:xfrm>
-            <a:off x="4394200" y="2562860"/>
-            <a:ext cx="264160" cy="142240"/>
-          </a:xfrm>
-          <a:prstGeom prst="rightArrow">
-            <a:avLst/>
-          </a:prstGeom>
-        </p:spPr>
-        <p:style>
-          <a:lnRef idx="2">
-            <a:schemeClr val="accent1">
-              <a:shade val="50000"/>
-            </a:schemeClr>
-          </a:lnRef>
-          <a:fillRef idx="1">
-            <a:schemeClr val="accent1"/>
-          </a:fillRef>
-          <a:effectRef idx="0">
-            <a:schemeClr val="accent1"/>
-          </a:effectRef>
-          <a:fontRef idx="minor">
-            <a:schemeClr val="lt1"/>
-          </a:fontRef>
-        </p:style>
-        <p:txBody>
-          <a:bodyPr rtlCol="0" anchor="ctr"/>
-          <a:lstStyle/>
-          <a:p>
-            <a:pPr algn="ctr"/>
-            <a:endParaRPr lang="zh-TW" altLang="en-US"/>
-          </a:p>
-        </p:txBody>
-      </p:sp>
-      <p:sp>
-        <p:nvSpPr>
-          <p:cNvPr id="15" name="向右箭號 14"/>
-          <p:cNvSpPr/>
-          <p:nvPr/>
-        </p:nvSpPr>
-        <p:spPr>
-          <a:xfrm>
-            <a:off x="4378960" y="2102327"/>
-            <a:ext cx="264160" cy="142240"/>
-          </a:xfrm>
-          <a:prstGeom prst="rightArrow">
-            <a:avLst/>
-          </a:prstGeom>
-        </p:spPr>
-        <p:style>
-          <a:lnRef idx="2">
-            <a:schemeClr val="accent1">
-              <a:shade val="50000"/>
-            </a:schemeClr>
-          </a:lnRef>
-          <a:fillRef idx="1">
-            <a:schemeClr val="accent1"/>
-          </a:fillRef>
-          <a:effectRef idx="0">
-            <a:schemeClr val="accent1"/>
-          </a:effectRef>
-          <a:fontRef idx="minor">
-            <a:schemeClr val="lt1"/>
-          </a:fontRef>
-        </p:style>
-        <p:txBody>
-          <a:bodyPr rtlCol="0" anchor="ctr"/>
-          <a:lstStyle/>
-          <a:p>
-            <a:pPr algn="ctr"/>
-            <a:endParaRPr lang="zh-TW" altLang="en-US"/>
-          </a:p>
-        </p:txBody>
-      </p:sp>
-      <p:sp>
-        <p:nvSpPr>
-          <p:cNvPr id="16" name="向右箭號 15"/>
-          <p:cNvSpPr/>
-          <p:nvPr/>
-        </p:nvSpPr>
-        <p:spPr>
-          <a:xfrm>
-            <a:off x="4343400" y="5504815"/>
-            <a:ext cx="264160" cy="142240"/>
-          </a:xfrm>
-          <a:prstGeom prst="rightArrow">
-            <a:avLst/>
-          </a:prstGeom>
-        </p:spPr>
-        <p:style>
-          <a:lnRef idx="2">
-            <a:schemeClr val="accent1">
-              <a:shade val="50000"/>
-            </a:schemeClr>
-          </a:lnRef>
-          <a:fillRef idx="1">
-            <a:schemeClr val="accent1"/>
-          </a:fillRef>
-          <a:effectRef idx="0">
-            <a:schemeClr val="accent1"/>
-          </a:effectRef>
-          <a:fontRef idx="minor">
-            <a:schemeClr val="lt1"/>
-          </a:fontRef>
-        </p:style>
-        <p:txBody>
-          <a:bodyPr rtlCol="0" anchor="ctr"/>
-          <a:lstStyle/>
-          <a:p>
-            <a:pPr algn="ctr"/>
-            <a:endParaRPr lang="zh-TW" altLang="en-US"/>
-          </a:p>
-        </p:txBody>
-      </p:sp>
-      <p:sp>
-        <p:nvSpPr>
-          <p:cNvPr id="17" name="向右箭號 16"/>
-          <p:cNvSpPr/>
-          <p:nvPr/>
-        </p:nvSpPr>
-        <p:spPr>
-          <a:xfrm>
-            <a:off x="4480560" y="4396104"/>
-            <a:ext cx="264160" cy="142240"/>
-          </a:xfrm>
-          <a:prstGeom prst="rightArrow">
-            <a:avLst/>
-          </a:prstGeom>
-        </p:spPr>
-        <p:style>
-          <a:lnRef idx="2">
-            <a:schemeClr val="accent1">
-              <a:shade val="50000"/>
-            </a:schemeClr>
-          </a:lnRef>
-          <a:fillRef idx="1">
-            <a:schemeClr val="accent1"/>
-          </a:fillRef>
-          <a:effectRef idx="0">
-            <a:schemeClr val="accent1"/>
-          </a:effectRef>
-          <a:fontRef idx="minor">
-            <a:schemeClr val="lt1"/>
-          </a:fontRef>
-        </p:style>
-        <p:txBody>
-          <a:bodyPr rtlCol="0" anchor="ctr"/>
-          <a:lstStyle/>
-          <a:p>
-            <a:pPr algn="ctr"/>
-            <a:endParaRPr lang="zh-TW" altLang="en-US"/>
-          </a:p>
-        </p:txBody>
-      </p:sp>
-      <p:sp>
-        <p:nvSpPr>
-          <p:cNvPr id="18" name="向右箭號 17"/>
-          <p:cNvSpPr/>
-          <p:nvPr/>
-        </p:nvSpPr>
-        <p:spPr>
-          <a:xfrm>
-            <a:off x="4475480" y="4613909"/>
-            <a:ext cx="264160" cy="142240"/>
-          </a:xfrm>
-          <a:prstGeom prst="rightArrow">
-            <a:avLst/>
-          </a:prstGeom>
-        </p:spPr>
-        <p:style>
-          <a:lnRef idx="2">
-            <a:schemeClr val="accent1">
-              <a:shade val="50000"/>
-            </a:schemeClr>
-          </a:lnRef>
-          <a:fillRef idx="1">
-            <a:schemeClr val="accent1"/>
-          </a:fillRef>
-          <a:effectRef idx="0">
-            <a:schemeClr val="accent1"/>
-          </a:effectRef>
-          <a:fontRef idx="minor">
-            <a:schemeClr val="lt1"/>
-          </a:fontRef>
-        </p:style>
-        <p:txBody>
-          <a:bodyPr rtlCol="0" anchor="ctr"/>
-          <a:lstStyle/>
-          <a:p>
-            <a:pPr algn="ctr"/>
-            <a:endParaRPr lang="zh-TW" altLang="en-US"/>
-          </a:p>
-        </p:txBody>
-      </p:sp>
-      <p:sp>
-        <p:nvSpPr>
-          <p:cNvPr id="19" name="向右箭號 18"/>
-          <p:cNvSpPr/>
-          <p:nvPr/>
-        </p:nvSpPr>
-        <p:spPr>
-          <a:xfrm>
-            <a:off x="4378960" y="3936207"/>
-            <a:ext cx="264160" cy="142240"/>
-          </a:xfrm>
-          <a:prstGeom prst="rightArrow">
-            <a:avLst/>
-          </a:prstGeom>
-        </p:spPr>
-        <p:style>
-          <a:lnRef idx="2">
-            <a:schemeClr val="accent1">
-              <a:shade val="50000"/>
-            </a:schemeClr>
-          </a:lnRef>
-          <a:fillRef idx="1">
-            <a:schemeClr val="accent1"/>
-          </a:fillRef>
-          <a:effectRef idx="0">
-            <a:schemeClr val="accent1"/>
-          </a:effectRef>
-          <a:fontRef idx="minor">
-            <a:schemeClr val="lt1"/>
-          </a:fontRef>
-        </p:style>
-        <p:txBody>
-          <a:bodyPr rtlCol="0" anchor="ctr"/>
-          <a:lstStyle/>
-          <a:p>
-            <a:pPr algn="ctr"/>
-            <a:endParaRPr lang="zh-TW" altLang="en-US"/>
-          </a:p>
-        </p:txBody>
-      </p:sp>
-      <p:sp>
-        <p:nvSpPr>
-          <p:cNvPr id="20" name="向右箭號 19"/>
-          <p:cNvSpPr/>
-          <p:nvPr/>
-        </p:nvSpPr>
-        <p:spPr>
-          <a:xfrm>
-            <a:off x="4343400" y="3257707"/>
-            <a:ext cx="264160" cy="142240"/>
-          </a:xfrm>
-          <a:prstGeom prst="rightArrow">
-            <a:avLst/>
-          </a:prstGeom>
-        </p:spPr>
-        <p:style>
-          <a:lnRef idx="2">
-            <a:schemeClr val="accent1">
-              <a:shade val="50000"/>
-            </a:schemeClr>
-          </a:lnRef>
-          <a:fillRef idx="1">
-            <a:schemeClr val="accent1"/>
-          </a:fillRef>
-          <a:effectRef idx="0">
-            <a:schemeClr val="accent1"/>
-          </a:effectRef>
-          <a:fontRef idx="minor">
-            <a:schemeClr val="lt1"/>
-          </a:fontRef>
-        </p:style>
-        <p:txBody>
-          <a:bodyPr rtlCol="0" anchor="ctr"/>
-          <a:lstStyle/>
-          <a:p>
-            <a:pPr algn="ctr"/>
-            <a:endParaRPr lang="zh-TW" altLang="en-US"/>
-          </a:p>
-        </p:txBody>
-      </p:sp>
-      <p:sp>
-        <p:nvSpPr>
-          <p:cNvPr id="21" name="向右箭號 20"/>
-          <p:cNvSpPr/>
-          <p:nvPr/>
-        </p:nvSpPr>
-        <p:spPr>
-          <a:xfrm>
-            <a:off x="4381500" y="4194492"/>
-            <a:ext cx="264160" cy="142240"/>
-          </a:xfrm>
-          <a:prstGeom prst="rightArrow">
-            <a:avLst/>
-          </a:prstGeom>
-        </p:spPr>
-        <p:style>
-          <a:lnRef idx="2">
-            <a:schemeClr val="accent1">
-              <a:shade val="50000"/>
-            </a:schemeClr>
-          </a:lnRef>
-          <a:fillRef idx="1">
-            <a:schemeClr val="accent1"/>
-          </a:fillRef>
-          <a:effectRef idx="0">
-            <a:schemeClr val="accent1"/>
-          </a:effectRef>
-          <a:fontRef idx="minor">
-            <a:schemeClr val="lt1"/>
-          </a:fontRef>
-        </p:style>
-        <p:txBody>
-          <a:bodyPr rtlCol="0" anchor="ctr"/>
-          <a:lstStyle/>
-          <a:p>
-            <a:pPr algn="ctr"/>
-            <a:endParaRPr lang="zh-TW" altLang="en-US"/>
-          </a:p>
-        </p:txBody>
-      </p:sp>
     </p:spTree>
     <p:extLst>
       <p:ext uri="{BB962C8B-B14F-4D97-AF65-F5344CB8AC3E}">
-        <p14:creationId xmlns:p14="http://schemas.microsoft.com/office/powerpoint/2010/main" val="2860429302"/>
+        <p14:creationId xmlns:p14="http://schemas.microsoft.com/office/powerpoint/2010/main" val="2181503427"/>
       </p:ext>
     </p:extLst>
   </p:cSld>
@@ -4284,26 +4742,26 @@
             <a:spLocks noGrp="1"/>
           </p:cNvSpPr>
           <p:nvPr>
-            <p:ph type="ctrTitle"/>
-          </p:nvPr>
-        </p:nvSpPr>
-        <p:spPr/>
-        <p:txBody>
-          <a:bodyPr/>
-          <a:lstStyle/>
-          <a:p>
-            <a:endParaRPr lang="zh-TW" altLang="en-US"/>
-          </a:p>
-        </p:txBody>
-      </p:sp>
-      <p:sp>
-        <p:nvSpPr>
-          <p:cNvPr id="3" name="副標題 2"/>
-          <p:cNvSpPr>
-            <a:spLocks noGrp="1"/>
-          </p:cNvSpPr>
-          <p:nvPr>
-            <p:ph type="subTitle" idx="1"/>
+            <p:ph type="title"/>
+          </p:nvPr>
+        </p:nvSpPr>
+        <p:spPr/>
+        <p:txBody>
+          <a:bodyPr/>
+          <a:lstStyle/>
+          <a:p>
+            <a:endParaRPr lang="zh-TW" altLang="en-US"/>
+          </a:p>
+        </p:txBody>
+      </p:sp>
+      <p:sp>
+        <p:nvSpPr>
+          <p:cNvPr id="3" name="內容版面配置區 2"/>
+          <p:cNvSpPr>
+            <a:spLocks noGrp="1"/>
+          </p:cNvSpPr>
+          <p:nvPr>
+            <p:ph idx="1"/>
           </p:nvPr>
         </p:nvSpPr>
         <p:spPr/>
@@ -4323,16 +4781,15 @@
           </p:cNvPicPr>
           <p:nvPr/>
         </p:nvPicPr>
-        <p:blipFill>
+        <p:blipFill rotWithShape="1">
           <a:blip r:embed="rId2"/>
-          <a:stretch>
-            <a:fillRect/>
-          </a:stretch>
+          <a:srcRect t="50421"/>
+          <a:stretch/>
         </p:blipFill>
         <p:spPr>
           <a:xfrm>
-            <a:off x="4180553" y="328134"/>
-            <a:ext cx="4991100" cy="6143625"/>
+            <a:off x="1174363" y="2430042"/>
+            <a:ext cx="11920607" cy="3650717"/>
           </a:xfrm>
           <a:prstGeom prst="rect">
             <a:avLst/>
@@ -4341,14 +4798,14 @@
       </p:pic>
       <p:sp>
         <p:nvSpPr>
-          <p:cNvPr id="7" name="向右箭號 6"/>
+          <p:cNvPr id="5" name="向右箭號 4"/>
           <p:cNvSpPr/>
           <p:nvPr/>
         </p:nvSpPr>
         <p:spPr>
-          <a:xfrm>
-            <a:off x="4343400" y="3036570"/>
-            <a:ext cx="264160" cy="142240"/>
+          <a:xfrm flipV="1">
+            <a:off x="945271" y="4694656"/>
+            <a:ext cx="458183" cy="197384"/>
           </a:xfrm>
           <a:prstGeom prst="rightArrow">
             <a:avLst/>
@@ -4381,14 +4838,14 @@
       </p:sp>
       <p:sp>
         <p:nvSpPr>
-          <p:cNvPr id="9" name="向右箭號 8"/>
+          <p:cNvPr id="6" name="向右箭號 5"/>
           <p:cNvSpPr/>
           <p:nvPr/>
         </p:nvSpPr>
         <p:spPr>
           <a:xfrm>
-            <a:off x="4343400" y="2799715"/>
-            <a:ext cx="264160" cy="142240"/>
+            <a:off x="1045313" y="3651455"/>
+            <a:ext cx="258097" cy="98322"/>
           </a:xfrm>
           <a:prstGeom prst="rightArrow">
             <a:avLst/>
@@ -4419,570 +4876,10 @@
           </a:p>
         </p:txBody>
       </p:sp>
-      <p:sp>
-        <p:nvSpPr>
-          <p:cNvPr id="10" name="向右箭號 9"/>
-          <p:cNvSpPr/>
-          <p:nvPr/>
-        </p:nvSpPr>
-        <p:spPr>
-          <a:xfrm>
-            <a:off x="4343400" y="4854575"/>
-            <a:ext cx="264160" cy="142240"/>
-          </a:xfrm>
-          <a:prstGeom prst="rightArrow">
-            <a:avLst/>
-          </a:prstGeom>
-        </p:spPr>
-        <p:style>
-          <a:lnRef idx="2">
-            <a:schemeClr val="accent1">
-              <a:shade val="50000"/>
-            </a:schemeClr>
-          </a:lnRef>
-          <a:fillRef idx="1">
-            <a:schemeClr val="accent1"/>
-          </a:fillRef>
-          <a:effectRef idx="0">
-            <a:schemeClr val="accent1"/>
-          </a:effectRef>
-          <a:fontRef idx="minor">
-            <a:schemeClr val="lt1"/>
-          </a:fontRef>
-        </p:style>
-        <p:txBody>
-          <a:bodyPr rtlCol="0" anchor="ctr"/>
-          <a:lstStyle/>
-          <a:p>
-            <a:pPr algn="ctr"/>
-            <a:endParaRPr lang="zh-TW" altLang="en-US"/>
-          </a:p>
-        </p:txBody>
-      </p:sp>
-      <p:sp>
-        <p:nvSpPr>
-          <p:cNvPr id="11" name="向右箭號 10"/>
-          <p:cNvSpPr/>
-          <p:nvPr/>
-        </p:nvSpPr>
-        <p:spPr>
-          <a:xfrm>
-            <a:off x="4378960" y="1666240"/>
-            <a:ext cx="264160" cy="142240"/>
-          </a:xfrm>
-          <a:prstGeom prst="rightArrow">
-            <a:avLst/>
-          </a:prstGeom>
-        </p:spPr>
-        <p:style>
-          <a:lnRef idx="2">
-            <a:schemeClr val="accent1">
-              <a:shade val="50000"/>
-            </a:schemeClr>
-          </a:lnRef>
-          <a:fillRef idx="1">
-            <a:schemeClr val="accent1"/>
-          </a:fillRef>
-          <a:effectRef idx="0">
-            <a:schemeClr val="accent1"/>
-          </a:effectRef>
-          <a:fontRef idx="minor">
-            <a:schemeClr val="lt1"/>
-          </a:fontRef>
-        </p:style>
-        <p:txBody>
-          <a:bodyPr rtlCol="0" anchor="ctr"/>
-          <a:lstStyle/>
-          <a:p>
-            <a:pPr algn="ctr"/>
-            <a:endParaRPr lang="zh-TW" altLang="en-US"/>
-          </a:p>
-        </p:txBody>
-      </p:sp>
-      <p:sp>
-        <p:nvSpPr>
-          <p:cNvPr id="12" name="向右箭號 11"/>
-          <p:cNvSpPr/>
-          <p:nvPr/>
-        </p:nvSpPr>
-        <p:spPr>
-          <a:xfrm>
-            <a:off x="4343400" y="1909129"/>
-            <a:ext cx="264160" cy="142240"/>
-          </a:xfrm>
-          <a:prstGeom prst="rightArrow">
-            <a:avLst/>
-          </a:prstGeom>
-        </p:spPr>
-        <p:style>
-          <a:lnRef idx="2">
-            <a:schemeClr val="accent1">
-              <a:shade val="50000"/>
-            </a:schemeClr>
-          </a:lnRef>
-          <a:fillRef idx="1">
-            <a:schemeClr val="accent1"/>
-          </a:fillRef>
-          <a:effectRef idx="0">
-            <a:schemeClr val="accent1"/>
-          </a:effectRef>
-          <a:fontRef idx="minor">
-            <a:schemeClr val="lt1"/>
-          </a:fontRef>
-        </p:style>
-        <p:txBody>
-          <a:bodyPr rtlCol="0" anchor="ctr"/>
-          <a:lstStyle/>
-          <a:p>
-            <a:pPr algn="ctr"/>
-            <a:endParaRPr lang="zh-TW" altLang="en-US"/>
-          </a:p>
-        </p:txBody>
-      </p:sp>
-      <p:sp>
-        <p:nvSpPr>
-          <p:cNvPr id="13" name="向右箭號 12"/>
-          <p:cNvSpPr/>
-          <p:nvPr/>
-        </p:nvSpPr>
-        <p:spPr>
-          <a:xfrm>
-            <a:off x="4371340" y="2345216"/>
-            <a:ext cx="264160" cy="142240"/>
-          </a:xfrm>
-          <a:prstGeom prst="rightArrow">
-            <a:avLst/>
-          </a:prstGeom>
-        </p:spPr>
-        <p:style>
-          <a:lnRef idx="2">
-            <a:schemeClr val="accent1">
-              <a:shade val="50000"/>
-            </a:schemeClr>
-          </a:lnRef>
-          <a:fillRef idx="1">
-            <a:schemeClr val="accent1"/>
-          </a:fillRef>
-          <a:effectRef idx="0">
-            <a:schemeClr val="accent1"/>
-          </a:effectRef>
-          <a:fontRef idx="minor">
-            <a:schemeClr val="lt1"/>
-          </a:fontRef>
-        </p:style>
-        <p:txBody>
-          <a:bodyPr rtlCol="0" anchor="ctr"/>
-          <a:lstStyle/>
-          <a:p>
-            <a:pPr algn="ctr"/>
-            <a:endParaRPr lang="zh-TW" altLang="en-US"/>
-          </a:p>
-        </p:txBody>
-      </p:sp>
-      <p:sp>
-        <p:nvSpPr>
-          <p:cNvPr id="14" name="向右箭號 13"/>
-          <p:cNvSpPr/>
-          <p:nvPr/>
-        </p:nvSpPr>
-        <p:spPr>
-          <a:xfrm>
-            <a:off x="4394200" y="2562860"/>
-            <a:ext cx="264160" cy="142240"/>
-          </a:xfrm>
-          <a:prstGeom prst="rightArrow">
-            <a:avLst/>
-          </a:prstGeom>
-        </p:spPr>
-        <p:style>
-          <a:lnRef idx="2">
-            <a:schemeClr val="accent1">
-              <a:shade val="50000"/>
-            </a:schemeClr>
-          </a:lnRef>
-          <a:fillRef idx="1">
-            <a:schemeClr val="accent1"/>
-          </a:fillRef>
-          <a:effectRef idx="0">
-            <a:schemeClr val="accent1"/>
-          </a:effectRef>
-          <a:fontRef idx="minor">
-            <a:schemeClr val="lt1"/>
-          </a:fontRef>
-        </p:style>
-        <p:txBody>
-          <a:bodyPr rtlCol="0" anchor="ctr"/>
-          <a:lstStyle/>
-          <a:p>
-            <a:pPr algn="ctr"/>
-            <a:endParaRPr lang="zh-TW" altLang="en-US"/>
-          </a:p>
-        </p:txBody>
-      </p:sp>
-      <p:sp>
-        <p:nvSpPr>
-          <p:cNvPr id="15" name="向右箭號 14"/>
-          <p:cNvSpPr/>
-          <p:nvPr/>
-        </p:nvSpPr>
-        <p:spPr>
-          <a:xfrm>
-            <a:off x="4378960" y="2102327"/>
-            <a:ext cx="264160" cy="142240"/>
-          </a:xfrm>
-          <a:prstGeom prst="rightArrow">
-            <a:avLst/>
-          </a:prstGeom>
-        </p:spPr>
-        <p:style>
-          <a:lnRef idx="2">
-            <a:schemeClr val="accent1">
-              <a:shade val="50000"/>
-            </a:schemeClr>
-          </a:lnRef>
-          <a:fillRef idx="1">
-            <a:schemeClr val="accent1"/>
-          </a:fillRef>
-          <a:effectRef idx="0">
-            <a:schemeClr val="accent1"/>
-          </a:effectRef>
-          <a:fontRef idx="minor">
-            <a:schemeClr val="lt1"/>
-          </a:fontRef>
-        </p:style>
-        <p:txBody>
-          <a:bodyPr rtlCol="0" anchor="ctr"/>
-          <a:lstStyle/>
-          <a:p>
-            <a:pPr algn="ctr"/>
-            <a:endParaRPr lang="zh-TW" altLang="en-US"/>
-          </a:p>
-        </p:txBody>
-      </p:sp>
-      <p:sp>
-        <p:nvSpPr>
-          <p:cNvPr id="16" name="向右箭號 15"/>
-          <p:cNvSpPr/>
-          <p:nvPr/>
-        </p:nvSpPr>
-        <p:spPr>
-          <a:xfrm>
-            <a:off x="4343400" y="5504815"/>
-            <a:ext cx="264160" cy="142240"/>
-          </a:xfrm>
-          <a:prstGeom prst="rightArrow">
-            <a:avLst/>
-          </a:prstGeom>
-        </p:spPr>
-        <p:style>
-          <a:lnRef idx="2">
-            <a:schemeClr val="accent1">
-              <a:shade val="50000"/>
-            </a:schemeClr>
-          </a:lnRef>
-          <a:fillRef idx="1">
-            <a:schemeClr val="accent1"/>
-          </a:fillRef>
-          <a:effectRef idx="0">
-            <a:schemeClr val="accent1"/>
-          </a:effectRef>
-          <a:fontRef idx="minor">
-            <a:schemeClr val="lt1"/>
-          </a:fontRef>
-        </p:style>
-        <p:txBody>
-          <a:bodyPr rtlCol="0" anchor="ctr"/>
-          <a:lstStyle/>
-          <a:p>
-            <a:pPr algn="ctr"/>
-            <a:endParaRPr lang="zh-TW" altLang="en-US"/>
-          </a:p>
-        </p:txBody>
-      </p:sp>
-      <p:sp>
-        <p:nvSpPr>
-          <p:cNvPr id="17" name="向右箭號 16"/>
-          <p:cNvSpPr/>
-          <p:nvPr/>
-        </p:nvSpPr>
-        <p:spPr>
-          <a:xfrm>
-            <a:off x="4480560" y="4396104"/>
-            <a:ext cx="264160" cy="142240"/>
-          </a:xfrm>
-          <a:prstGeom prst="rightArrow">
-            <a:avLst/>
-          </a:prstGeom>
-        </p:spPr>
-        <p:style>
-          <a:lnRef idx="2">
-            <a:schemeClr val="accent1">
-              <a:shade val="50000"/>
-            </a:schemeClr>
-          </a:lnRef>
-          <a:fillRef idx="1">
-            <a:schemeClr val="accent1"/>
-          </a:fillRef>
-          <a:effectRef idx="0">
-            <a:schemeClr val="accent1"/>
-          </a:effectRef>
-          <a:fontRef idx="minor">
-            <a:schemeClr val="lt1"/>
-          </a:fontRef>
-        </p:style>
-        <p:txBody>
-          <a:bodyPr rtlCol="0" anchor="ctr"/>
-          <a:lstStyle/>
-          <a:p>
-            <a:pPr algn="ctr"/>
-            <a:endParaRPr lang="zh-TW" altLang="en-US"/>
-          </a:p>
-        </p:txBody>
-      </p:sp>
-      <p:sp>
-        <p:nvSpPr>
-          <p:cNvPr id="18" name="向右箭號 17"/>
-          <p:cNvSpPr/>
-          <p:nvPr/>
-        </p:nvSpPr>
-        <p:spPr>
-          <a:xfrm>
-            <a:off x="4475480" y="4613909"/>
-            <a:ext cx="264160" cy="142240"/>
-          </a:xfrm>
-          <a:prstGeom prst="rightArrow">
-            <a:avLst/>
-          </a:prstGeom>
-        </p:spPr>
-        <p:style>
-          <a:lnRef idx="2">
-            <a:schemeClr val="accent1">
-              <a:shade val="50000"/>
-            </a:schemeClr>
-          </a:lnRef>
-          <a:fillRef idx="1">
-            <a:schemeClr val="accent1"/>
-          </a:fillRef>
-          <a:effectRef idx="0">
-            <a:schemeClr val="accent1"/>
-          </a:effectRef>
-          <a:fontRef idx="minor">
-            <a:schemeClr val="lt1"/>
-          </a:fontRef>
-        </p:style>
-        <p:txBody>
-          <a:bodyPr rtlCol="0" anchor="ctr"/>
-          <a:lstStyle/>
-          <a:p>
-            <a:pPr algn="ctr"/>
-            <a:endParaRPr lang="zh-TW" altLang="en-US"/>
-          </a:p>
-        </p:txBody>
-      </p:sp>
-      <p:sp>
-        <p:nvSpPr>
-          <p:cNvPr id="19" name="向右箭號 18"/>
-          <p:cNvSpPr/>
-          <p:nvPr/>
-        </p:nvSpPr>
-        <p:spPr>
-          <a:xfrm>
-            <a:off x="4378960" y="3936207"/>
-            <a:ext cx="264160" cy="142240"/>
-          </a:xfrm>
-          <a:prstGeom prst="rightArrow">
-            <a:avLst/>
-          </a:prstGeom>
-        </p:spPr>
-        <p:style>
-          <a:lnRef idx="2">
-            <a:schemeClr val="accent1">
-              <a:shade val="50000"/>
-            </a:schemeClr>
-          </a:lnRef>
-          <a:fillRef idx="1">
-            <a:schemeClr val="accent1"/>
-          </a:fillRef>
-          <a:effectRef idx="0">
-            <a:schemeClr val="accent1"/>
-          </a:effectRef>
-          <a:fontRef idx="minor">
-            <a:schemeClr val="lt1"/>
-          </a:fontRef>
-        </p:style>
-        <p:txBody>
-          <a:bodyPr rtlCol="0" anchor="ctr"/>
-          <a:lstStyle/>
-          <a:p>
-            <a:pPr algn="ctr"/>
-            <a:endParaRPr lang="zh-TW" altLang="en-US"/>
-          </a:p>
-        </p:txBody>
-      </p:sp>
-      <p:sp>
-        <p:nvSpPr>
-          <p:cNvPr id="20" name="向右箭號 19"/>
-          <p:cNvSpPr/>
-          <p:nvPr/>
-        </p:nvSpPr>
-        <p:spPr>
-          <a:xfrm>
-            <a:off x="4343400" y="3257707"/>
-            <a:ext cx="264160" cy="142240"/>
-          </a:xfrm>
-          <a:prstGeom prst="rightArrow">
-            <a:avLst/>
-          </a:prstGeom>
-        </p:spPr>
-        <p:style>
-          <a:lnRef idx="2">
-            <a:schemeClr val="accent1">
-              <a:shade val="50000"/>
-            </a:schemeClr>
-          </a:lnRef>
-          <a:fillRef idx="1">
-            <a:schemeClr val="accent1"/>
-          </a:fillRef>
-          <a:effectRef idx="0">
-            <a:schemeClr val="accent1"/>
-          </a:effectRef>
-          <a:fontRef idx="minor">
-            <a:schemeClr val="lt1"/>
-          </a:fontRef>
-        </p:style>
-        <p:txBody>
-          <a:bodyPr rtlCol="0" anchor="ctr"/>
-          <a:lstStyle/>
-          <a:p>
-            <a:pPr algn="ctr"/>
-            <a:endParaRPr lang="zh-TW" altLang="en-US"/>
-          </a:p>
-        </p:txBody>
-      </p:sp>
-      <p:sp>
-        <p:nvSpPr>
-          <p:cNvPr id="21" name="向右箭號 20"/>
-          <p:cNvSpPr/>
-          <p:nvPr/>
-        </p:nvSpPr>
-        <p:spPr>
-          <a:xfrm>
-            <a:off x="4381500" y="4194492"/>
-            <a:ext cx="264160" cy="142240"/>
-          </a:xfrm>
-          <a:prstGeom prst="rightArrow">
-            <a:avLst/>
-          </a:prstGeom>
-        </p:spPr>
-        <p:style>
-          <a:lnRef idx="2">
-            <a:schemeClr val="accent1">
-              <a:shade val="50000"/>
-            </a:schemeClr>
-          </a:lnRef>
-          <a:fillRef idx="1">
-            <a:schemeClr val="accent1"/>
-          </a:fillRef>
-          <a:effectRef idx="0">
-            <a:schemeClr val="accent1"/>
-          </a:effectRef>
-          <a:fontRef idx="minor">
-            <a:schemeClr val="lt1"/>
-          </a:fontRef>
-        </p:style>
-        <p:txBody>
-          <a:bodyPr rtlCol="0" anchor="ctr"/>
-          <a:lstStyle/>
-          <a:p>
-            <a:pPr algn="ctr"/>
-            <a:endParaRPr lang="zh-TW" altLang="en-US"/>
-          </a:p>
-        </p:txBody>
-      </p:sp>
-      <p:sp>
-        <p:nvSpPr>
-          <p:cNvPr id="22" name="向右箭號 21"/>
-          <p:cNvSpPr/>
-          <p:nvPr/>
-        </p:nvSpPr>
-        <p:spPr>
-          <a:xfrm>
-            <a:off x="4698181" y="1386687"/>
-            <a:ext cx="264160" cy="142240"/>
-          </a:xfrm>
-          <a:prstGeom prst="rightArrow">
-            <a:avLst/>
-          </a:prstGeom>
-        </p:spPr>
-        <p:style>
-          <a:lnRef idx="2">
-            <a:schemeClr val="accent1">
-              <a:shade val="50000"/>
-            </a:schemeClr>
-          </a:lnRef>
-          <a:fillRef idx="1">
-            <a:schemeClr val="accent1"/>
-          </a:fillRef>
-          <a:effectRef idx="0">
-            <a:schemeClr val="accent1"/>
-          </a:effectRef>
-          <a:fontRef idx="minor">
-            <a:schemeClr val="lt1"/>
-          </a:fontRef>
-        </p:style>
-        <p:txBody>
-          <a:bodyPr rtlCol="0" anchor="ctr"/>
-          <a:lstStyle/>
-          <a:p>
-            <a:pPr algn="ctr"/>
-            <a:endParaRPr lang="zh-TW" altLang="en-US"/>
-          </a:p>
-        </p:txBody>
-      </p:sp>
-      <p:sp>
-        <p:nvSpPr>
-          <p:cNvPr id="23" name="向右箭號 22"/>
-          <p:cNvSpPr/>
-          <p:nvPr/>
-        </p:nvSpPr>
-        <p:spPr>
-          <a:xfrm>
-            <a:off x="4741402" y="1168882"/>
-            <a:ext cx="264160" cy="142240"/>
-          </a:xfrm>
-          <a:prstGeom prst="rightArrow">
-            <a:avLst/>
-          </a:prstGeom>
-        </p:spPr>
-        <p:style>
-          <a:lnRef idx="2">
-            <a:schemeClr val="accent1">
-              <a:shade val="50000"/>
-            </a:schemeClr>
-          </a:lnRef>
-          <a:fillRef idx="1">
-            <a:schemeClr val="accent1"/>
-          </a:fillRef>
-          <a:effectRef idx="0">
-            <a:schemeClr val="accent1"/>
-          </a:effectRef>
-          <a:fontRef idx="minor">
-            <a:schemeClr val="lt1"/>
-          </a:fontRef>
-        </p:style>
-        <p:txBody>
-          <a:bodyPr rtlCol="0" anchor="ctr"/>
-          <a:lstStyle/>
-          <a:p>
-            <a:pPr algn="ctr"/>
-            <a:endParaRPr lang="zh-TW" altLang="en-US"/>
-          </a:p>
-        </p:txBody>
-      </p:sp>
     </p:spTree>
     <p:extLst>
       <p:ext uri="{BB962C8B-B14F-4D97-AF65-F5344CB8AC3E}">
-        <p14:creationId xmlns:p14="http://schemas.microsoft.com/office/powerpoint/2010/main" val="519776917"/>
+        <p14:creationId xmlns:p14="http://schemas.microsoft.com/office/powerpoint/2010/main" val="4274697394"/>
       </p:ext>
     </p:extLst>
   </p:cSld>
@@ -5088,10 +4985,20 @@
               <a:t>會問是否存檔</a:t>
             </a:r>
             <a:r>
-              <a:rPr lang="en-US" altLang="zh-TW" smtClean="0"/>
+              <a:rPr lang="en-US" altLang="zh-TW" dirty="0" smtClean="0"/>
               <a:t>?</a:t>
             </a:r>
-            <a:endParaRPr lang="zh-TW" altLang="en-US"/>
+          </a:p>
+          <a:p>
+            <a:r>
+              <a:rPr lang="zh-TW" altLang="en-US" dirty="0"/>
+              <a:t>清大馬達又突然測試通過</a:t>
+            </a:r>
+            <a:r>
+              <a:rPr lang="zh-TW" altLang="en-US" dirty="0" smtClean="0"/>
+              <a:t>了，原因不明</a:t>
+            </a:r>
+            <a:endParaRPr lang="zh-TW" altLang="en-US" dirty="0"/>
           </a:p>
         </p:txBody>
       </p:sp>
@@ -5179,8 +5086,8 @@
         </p:blipFill>
         <p:spPr>
           <a:xfrm>
-            <a:off x="-3005138" y="-1476375"/>
-            <a:ext cx="18202275" cy="9810750"/>
+            <a:off x="1" y="0"/>
+            <a:ext cx="12723920" cy="6858000"/>
           </a:xfrm>
           <a:prstGeom prst="rect">
             <a:avLst/>
@@ -5191,6 +5098,454 @@
     <p:extLst>
       <p:ext uri="{BB962C8B-B14F-4D97-AF65-F5344CB8AC3E}">
         <p14:creationId xmlns:p14="http://schemas.microsoft.com/office/powerpoint/2010/main" val="1979926965"/>
+      </p:ext>
+    </p:extLst>
+  </p:cSld>
+  <p:clrMapOvr>
+    <a:masterClrMapping/>
+  </p:clrMapOvr>
+</p:sld>
+</file>
+
+<file path=ppt/slides/slide6.xml><?xml version="1.0" encoding="utf-8"?>
+<p:sld xmlns:a="http://schemas.openxmlformats.org/drawingml/2006/main" xmlns:r="http://schemas.openxmlformats.org/officeDocument/2006/relationships" xmlns:p="http://schemas.openxmlformats.org/presentationml/2006/main">
+  <p:cSld>
+    <p:spTree>
+      <p:nvGrpSpPr>
+        <p:cNvPr id="1" name=""/>
+        <p:cNvGrpSpPr/>
+        <p:nvPr/>
+      </p:nvGrpSpPr>
+      <p:grpSpPr>
+        <a:xfrm>
+          <a:off x="0" y="0"/>
+          <a:ext cx="0" cy="0"/>
+          <a:chOff x="0" y="0"/>
+          <a:chExt cx="0" cy="0"/>
+        </a:xfrm>
+      </p:grpSpPr>
+      <p:sp>
+        <p:nvSpPr>
+          <p:cNvPr id="2" name="標題 1"/>
+          <p:cNvSpPr>
+            <a:spLocks noGrp="1"/>
+          </p:cNvSpPr>
+          <p:nvPr>
+            <p:ph type="title"/>
+          </p:nvPr>
+        </p:nvSpPr>
+        <p:spPr/>
+        <p:txBody>
+          <a:bodyPr/>
+          <a:lstStyle/>
+          <a:p>
+            <a:r>
+              <a:rPr lang="zh-TW" altLang="en-US" dirty="0" smtClean="0"/>
+              <a:t>檔案特徵</a:t>
+            </a:r>
+            <a:endParaRPr lang="zh-TW" altLang="en-US" dirty="0"/>
+          </a:p>
+        </p:txBody>
+      </p:sp>
+      <p:sp>
+        <p:nvSpPr>
+          <p:cNvPr id="3" name="內容版面配置區 2"/>
+          <p:cNvSpPr>
+            <a:spLocks noGrp="1"/>
+          </p:cNvSpPr>
+          <p:nvPr>
+            <p:ph idx="1"/>
+          </p:nvPr>
+        </p:nvSpPr>
+        <p:spPr/>
+        <p:txBody>
+          <a:bodyPr/>
+          <a:lstStyle/>
+          <a:p>
+            <a:r>
+              <a:rPr lang="zh-TW" altLang="en-US" dirty="0" smtClean="0"/>
+              <a:t>沒有結合</a:t>
+            </a:r>
+            <a:endParaRPr lang="zh-TW" altLang="en-US" dirty="0"/>
+          </a:p>
+        </p:txBody>
+      </p:sp>
+    </p:spTree>
+    <p:extLst>
+      <p:ext uri="{BB962C8B-B14F-4D97-AF65-F5344CB8AC3E}">
+        <p14:creationId xmlns:p14="http://schemas.microsoft.com/office/powerpoint/2010/main" val="3332526238"/>
+      </p:ext>
+    </p:extLst>
+  </p:cSld>
+  <p:clrMapOvr>
+    <a:masterClrMapping/>
+  </p:clrMapOvr>
+</p:sld>
+</file>
+
+<file path=ppt/slides/slide7.xml><?xml version="1.0" encoding="utf-8"?>
+<p:sld xmlns:a="http://schemas.openxmlformats.org/drawingml/2006/main" xmlns:r="http://schemas.openxmlformats.org/officeDocument/2006/relationships" xmlns:p="http://schemas.openxmlformats.org/presentationml/2006/main">
+  <p:cSld>
+    <p:spTree>
+      <p:nvGrpSpPr>
+        <p:cNvPr id="1" name=""/>
+        <p:cNvGrpSpPr/>
+        <p:nvPr/>
+      </p:nvGrpSpPr>
+      <p:grpSpPr>
+        <a:xfrm>
+          <a:off x="0" y="0"/>
+          <a:ext cx="0" cy="0"/>
+          <a:chOff x="0" y="0"/>
+          <a:chExt cx="0" cy="0"/>
+        </a:xfrm>
+      </p:grpSpPr>
+      <p:sp>
+        <p:nvSpPr>
+          <p:cNvPr id="2" name="標題 1"/>
+          <p:cNvSpPr>
+            <a:spLocks noGrp="1"/>
+          </p:cNvSpPr>
+          <p:nvPr>
+            <p:ph type="title"/>
+          </p:nvPr>
+        </p:nvSpPr>
+        <p:spPr/>
+        <p:txBody>
+          <a:bodyPr/>
+          <a:lstStyle/>
+          <a:p>
+            <a:r>
+              <a:rPr lang="en-US" altLang="zh-TW" dirty="0" err="1" smtClean="0"/>
+              <a:t>Asm</a:t>
+            </a:r>
+            <a:r>
+              <a:rPr lang="zh-TW" altLang="en-US" dirty="0" smtClean="0"/>
+              <a:t> </a:t>
+            </a:r>
+            <a:r>
+              <a:rPr lang="en-US" altLang="zh-TW" dirty="0" smtClean="0"/>
+              <a:t>mate</a:t>
+            </a:r>
+            <a:r>
+              <a:rPr lang="zh-TW" altLang="en-US" dirty="0" smtClean="0"/>
+              <a:t>測試不過</a:t>
+            </a:r>
+            <a:endParaRPr lang="zh-TW" altLang="en-US" dirty="0"/>
+          </a:p>
+        </p:txBody>
+      </p:sp>
+      <p:sp>
+        <p:nvSpPr>
+          <p:cNvPr id="3" name="內容版面配置區 2"/>
+          <p:cNvSpPr>
+            <a:spLocks noGrp="1"/>
+          </p:cNvSpPr>
+          <p:nvPr>
+            <p:ph idx="1"/>
+          </p:nvPr>
+        </p:nvSpPr>
+        <p:spPr/>
+        <p:txBody>
+          <a:bodyPr/>
+          <a:lstStyle/>
+          <a:p>
+            <a:r>
+              <a:rPr lang="zh-TW" altLang="en-US" dirty="0" smtClean="0"/>
+              <a:t>原因</a:t>
+            </a:r>
+            <a:endParaRPr lang="en-US" altLang="zh-TW" dirty="0" smtClean="0"/>
+          </a:p>
+          <a:p>
+            <a:pPr lvl="1"/>
+            <a:r>
+              <a:rPr lang="zh-TW" altLang="en-US" dirty="0"/>
+              <a:t>此檔案</a:t>
+            </a:r>
+            <a:r>
+              <a:rPr lang="zh-TW" altLang="en-US" dirty="0" smtClean="0"/>
+              <a:t>非</a:t>
+            </a:r>
+            <a:r>
+              <a:rPr lang="zh-TW" altLang="en-US" dirty="0"/>
+              <a:t>普通的</a:t>
+            </a:r>
+            <a:r>
+              <a:rPr lang="zh-TW" altLang="en-US" dirty="0" smtClean="0"/>
+              <a:t>檔案，好像適用工程圖建構出來的</a:t>
+            </a:r>
+            <a:r>
+              <a:rPr lang="en-US" altLang="zh-TW" dirty="0" smtClean="0"/>
+              <a:t>(</a:t>
+            </a:r>
+            <a:r>
+              <a:rPr lang="zh-TW" altLang="en-US" dirty="0" smtClean="0"/>
+              <a:t>綠色箭頭暗示這點</a:t>
+            </a:r>
+            <a:r>
+              <a:rPr lang="en-US" altLang="zh-TW" dirty="0" smtClean="0"/>
+              <a:t>?)</a:t>
+            </a:r>
+            <a:r>
+              <a:rPr lang="zh-TW" altLang="en-US" dirty="0" smtClean="0"/>
+              <a:t>，因此根本沒有結合資料夾</a:t>
+            </a:r>
+            <a:endParaRPr lang="en-US" altLang="zh-TW" dirty="0" smtClean="0"/>
+          </a:p>
+          <a:p>
+            <a:endParaRPr lang="en-US" altLang="zh-TW" dirty="0" smtClean="0"/>
+          </a:p>
+          <a:p>
+            <a:endParaRPr lang="zh-TW" altLang="en-US" dirty="0"/>
+          </a:p>
+        </p:txBody>
+      </p:sp>
+    </p:spTree>
+    <p:extLst>
+      <p:ext uri="{BB962C8B-B14F-4D97-AF65-F5344CB8AC3E}">
+        <p14:creationId xmlns:p14="http://schemas.microsoft.com/office/powerpoint/2010/main" val="2178101535"/>
+      </p:ext>
+    </p:extLst>
+  </p:cSld>
+  <p:clrMapOvr>
+    <a:masterClrMapping/>
+  </p:clrMapOvr>
+</p:sld>
+</file>
+
+<file path=ppt/slides/slide8.xml><?xml version="1.0" encoding="utf-8"?>
+<p:sld xmlns:a="http://schemas.openxmlformats.org/drawingml/2006/main" xmlns:r="http://schemas.openxmlformats.org/officeDocument/2006/relationships" xmlns:p="http://schemas.openxmlformats.org/presentationml/2006/main">
+  <p:cSld>
+    <p:spTree>
+      <p:nvGrpSpPr>
+        <p:cNvPr id="1" name=""/>
+        <p:cNvGrpSpPr/>
+        <p:nvPr/>
+      </p:nvGrpSpPr>
+      <p:grpSpPr>
+        <a:xfrm>
+          <a:off x="0" y="0"/>
+          <a:ext cx="0" cy="0"/>
+          <a:chOff x="0" y="0"/>
+          <a:chExt cx="0" cy="0"/>
+        </a:xfrm>
+      </p:grpSpPr>
+      <p:sp>
+        <p:nvSpPr>
+          <p:cNvPr id="2" name="標題 1"/>
+          <p:cNvSpPr>
+            <a:spLocks noGrp="1"/>
+          </p:cNvSpPr>
+          <p:nvPr>
+            <p:ph type="title"/>
+          </p:nvPr>
+        </p:nvSpPr>
+        <p:spPr/>
+        <p:txBody>
+          <a:bodyPr/>
+          <a:lstStyle/>
+          <a:p>
+            <a:endParaRPr lang="zh-TW" altLang="en-US"/>
+          </a:p>
+        </p:txBody>
+      </p:sp>
+      <p:sp>
+        <p:nvSpPr>
+          <p:cNvPr id="3" name="內容版面配置區 2"/>
+          <p:cNvSpPr>
+            <a:spLocks noGrp="1"/>
+          </p:cNvSpPr>
+          <p:nvPr>
+            <p:ph idx="1"/>
+          </p:nvPr>
+        </p:nvSpPr>
+        <p:spPr/>
+        <p:txBody>
+          <a:bodyPr/>
+          <a:lstStyle/>
+          <a:p>
+            <a:endParaRPr lang="zh-TW" altLang="en-US"/>
+          </a:p>
+        </p:txBody>
+      </p:sp>
+      <p:pic>
+        <p:nvPicPr>
+          <p:cNvPr id="4" name="圖片 3"/>
+          <p:cNvPicPr>
+            <a:picLocks noChangeAspect="1"/>
+          </p:cNvPicPr>
+          <p:nvPr/>
+        </p:nvPicPr>
+        <p:blipFill>
+          <a:blip r:embed="rId3"/>
+          <a:stretch>
+            <a:fillRect/>
+          </a:stretch>
+        </p:blipFill>
+        <p:spPr>
+          <a:xfrm>
+            <a:off x="0" y="0"/>
+            <a:ext cx="12833684" cy="6858000"/>
+          </a:xfrm>
+          <a:prstGeom prst="rect">
+            <a:avLst/>
+          </a:prstGeom>
+        </p:spPr>
+      </p:pic>
+    </p:spTree>
+    <p:extLst>
+      <p:ext uri="{BB962C8B-B14F-4D97-AF65-F5344CB8AC3E}">
+        <p14:creationId xmlns:p14="http://schemas.microsoft.com/office/powerpoint/2010/main" val="1916079800"/>
+      </p:ext>
+    </p:extLst>
+  </p:cSld>
+  <p:clrMapOvr>
+    <a:masterClrMapping/>
+  </p:clrMapOvr>
+</p:sld>
+</file>
+
+<file path=ppt/slides/slide9.xml><?xml version="1.0" encoding="utf-8"?>
+<p:sld xmlns:a="http://schemas.openxmlformats.org/drawingml/2006/main" xmlns:r="http://schemas.openxmlformats.org/officeDocument/2006/relationships" xmlns:p="http://schemas.openxmlformats.org/presentationml/2006/main">
+  <p:cSld>
+    <p:spTree>
+      <p:nvGrpSpPr>
+        <p:cNvPr id="1" name=""/>
+        <p:cNvGrpSpPr/>
+        <p:nvPr/>
+      </p:nvGrpSpPr>
+      <p:grpSpPr>
+        <a:xfrm>
+          <a:off x="0" y="0"/>
+          <a:ext cx="0" cy="0"/>
+          <a:chOff x="0" y="0"/>
+          <a:chExt cx="0" cy="0"/>
+        </a:xfrm>
+      </p:grpSpPr>
+      <p:sp>
+        <p:nvSpPr>
+          <p:cNvPr id="2" name="標題 1"/>
+          <p:cNvSpPr>
+            <a:spLocks noGrp="1"/>
+          </p:cNvSpPr>
+          <p:nvPr>
+            <p:ph type="title"/>
+          </p:nvPr>
+        </p:nvSpPr>
+        <p:spPr/>
+        <p:txBody>
+          <a:bodyPr/>
+          <a:lstStyle/>
+          <a:p>
+            <a:r>
+              <a:rPr lang="en-US" altLang="zh-TW" dirty="0" err="1" smtClean="0"/>
+              <a:t>Asm</a:t>
+            </a:r>
+            <a:r>
+              <a:rPr lang="zh-TW" altLang="en-US" dirty="0" smtClean="0"/>
+              <a:t> </a:t>
+            </a:r>
+            <a:r>
+              <a:rPr lang="en-US" altLang="zh-TW" dirty="0" smtClean="0"/>
+              <a:t>mate</a:t>
+            </a:r>
+            <a:r>
+              <a:rPr lang="zh-TW" altLang="en-US" dirty="0" smtClean="0"/>
+              <a:t>測試不過</a:t>
+            </a:r>
+            <a:r>
+              <a:rPr lang="en-US" altLang="zh-TW" dirty="0" smtClean="0"/>
+              <a:t>or</a:t>
+            </a:r>
+            <a:r>
+              <a:rPr lang="zh-TW" altLang="en-US" dirty="0" smtClean="0"/>
+              <a:t>通過</a:t>
+            </a:r>
+            <a:endParaRPr lang="zh-TW" altLang="en-US" dirty="0"/>
+          </a:p>
+        </p:txBody>
+      </p:sp>
+      <p:sp>
+        <p:nvSpPr>
+          <p:cNvPr id="3" name="內容版面配置區 2"/>
+          <p:cNvSpPr>
+            <a:spLocks noGrp="1"/>
+          </p:cNvSpPr>
+          <p:nvPr>
+            <p:ph idx="1"/>
+          </p:nvPr>
+        </p:nvSpPr>
+        <p:spPr/>
+        <p:txBody>
+          <a:bodyPr/>
+          <a:lstStyle/>
+          <a:p>
+            <a:r>
+              <a:rPr lang="zh-TW" altLang="en-US" dirty="0" smtClean="0"/>
+              <a:t>不過原因</a:t>
+            </a:r>
+            <a:endParaRPr lang="en-US" altLang="zh-TW" dirty="0" smtClean="0"/>
+          </a:p>
+          <a:p>
+            <a:pPr lvl="1"/>
+            <a:r>
+              <a:rPr lang="zh-TW" altLang="en-US" dirty="0" smtClean="0"/>
+              <a:t>下一頁</a:t>
+            </a:r>
+            <a:endParaRPr lang="en-US" altLang="zh-TW" dirty="0" smtClean="0"/>
+          </a:p>
+          <a:p>
+            <a:r>
+              <a:rPr lang="zh-TW" altLang="en-US" dirty="0" smtClean="0"/>
+              <a:t>通過</a:t>
+            </a:r>
+            <a:endParaRPr lang="en-US" altLang="zh-TW" dirty="0" smtClean="0"/>
+          </a:p>
+          <a:p>
+            <a:pPr lvl="1"/>
+            <a:r>
+              <a:rPr lang="zh-TW" altLang="en-US" dirty="0" smtClean="0"/>
+              <a:t>原因</a:t>
+            </a:r>
+            <a:endParaRPr lang="en-US" altLang="zh-TW" dirty="0" smtClean="0"/>
+          </a:p>
+          <a:p>
+            <a:pPr lvl="2"/>
+            <a:r>
+              <a:rPr lang="zh-TW" altLang="en-US" dirty="0" smtClean="0"/>
+              <a:t>不明</a:t>
+            </a:r>
+            <a:endParaRPr lang="en-US" altLang="zh-TW" dirty="0" smtClean="0"/>
+          </a:p>
+          <a:p>
+            <a:pPr lvl="1"/>
+            <a:r>
+              <a:rPr lang="zh-TW" altLang="en-US" dirty="0" smtClean="0"/>
+              <a:t>通過方式</a:t>
+            </a:r>
+            <a:endParaRPr lang="en-US" altLang="zh-TW" dirty="0"/>
+          </a:p>
+          <a:p>
+            <a:pPr lvl="2"/>
+            <a:r>
+              <a:rPr lang="zh-TW" altLang="en-US" dirty="0" smtClean="0"/>
+              <a:t>設一個中斷點，重複案執行到此中斷點，就會通過</a:t>
+            </a:r>
+            <a:endParaRPr lang="en-US" altLang="zh-TW" dirty="0" smtClean="0"/>
+          </a:p>
+          <a:p>
+            <a:pPr lvl="1"/>
+            <a:endParaRPr lang="en-US" altLang="zh-TW" dirty="0" smtClean="0"/>
+          </a:p>
+          <a:p>
+            <a:endParaRPr lang="zh-TW" altLang="en-US" dirty="0"/>
+          </a:p>
+        </p:txBody>
+      </p:sp>
+    </p:spTree>
+    <p:extLst>
+      <p:ext uri="{BB962C8B-B14F-4D97-AF65-F5344CB8AC3E}">
+        <p14:creationId xmlns:p14="http://schemas.microsoft.com/office/powerpoint/2010/main" val="3602396755"/>
       </p:ext>
     </p:extLst>
   </p:cSld>
@@ -5459,4 +5814,265 @@
     </a:ext>
   </a:extLst>
 </a:theme>
+</file>
+
+<file path=ppt/theme/theme2.xml><?xml version="1.0" encoding="utf-8"?>
+<a:theme xmlns:a="http://schemas.openxmlformats.org/drawingml/2006/main" name="Office 佈景主題">
+  <a:themeElements>
+    <a:clrScheme name="Office">
+      <a:dk1>
+        <a:sysClr val="windowText" lastClr="000000"/>
+      </a:dk1>
+      <a:lt1>
+        <a:sysClr val="window" lastClr="FFFFFF"/>
+      </a:lt1>
+      <a:dk2>
+        <a:srgbClr val="44546A"/>
+      </a:dk2>
+      <a:lt2>
+        <a:srgbClr val="E7E6E6"/>
+      </a:lt2>
+      <a:accent1>
+        <a:srgbClr val="5B9BD5"/>
+      </a:accent1>
+      <a:accent2>
+        <a:srgbClr val="ED7D31"/>
+      </a:accent2>
+      <a:accent3>
+        <a:srgbClr val="A5A5A5"/>
+      </a:accent3>
+      <a:accent4>
+        <a:srgbClr val="FFC000"/>
+      </a:accent4>
+      <a:accent5>
+        <a:srgbClr val="4472C4"/>
+      </a:accent5>
+      <a:accent6>
+        <a:srgbClr val="70AD47"/>
+      </a:accent6>
+      <a:hlink>
+        <a:srgbClr val="0563C1"/>
+      </a:hlink>
+      <a:folHlink>
+        <a:srgbClr val="954F72"/>
+      </a:folHlink>
+    </a:clrScheme>
+    <a:fontScheme name="Office">
+      <a:majorFont>
+        <a:latin typeface="Calibri Light" panose="020F0302020204030204"/>
+        <a:ea typeface=""/>
+        <a:cs typeface=""/>
+        <a:font script="Jpan" typeface="游ゴシック Light"/>
+        <a:font script="Hang" typeface="맑은 고딕"/>
+        <a:font script="Hans" typeface="等线 Light"/>
+        <a:font script="Hant" typeface="新細明體"/>
+        <a:font script="Arab" typeface="Times New Roman"/>
+        <a:font script="Hebr" typeface="Times New Roman"/>
+        <a:font script="Thai" typeface="Angsana New"/>
+        <a:font script="Ethi" typeface="Nyala"/>
+        <a:font script="Beng" typeface="Vrinda"/>
+        <a:font script="Gujr" typeface="Shruti"/>
+        <a:font script="Khmr" typeface="MoolBoran"/>
+        <a:font script="Knda" typeface="Tunga"/>
+        <a:font script="Guru" typeface="Raavi"/>
+        <a:font script="Cans" typeface="Euphemia"/>
+        <a:font script="Cher" typeface="Plantagenet Cherokee"/>
+        <a:font script="Yiii" typeface="Microsoft Yi Baiti"/>
+        <a:font script="Tibt" typeface="Microsoft Himalaya"/>
+        <a:font script="Thaa" typeface="MV Boli"/>
+        <a:font script="Deva" typeface="Mangal"/>
+        <a:font script="Telu" typeface="Gautami"/>
+        <a:font script="Taml" typeface="Latha"/>
+        <a:font script="Syrc" typeface="Estrangelo Edessa"/>
+        <a:font script="Orya" typeface="Kalinga"/>
+        <a:font script="Mlym" typeface="Kartika"/>
+        <a:font script="Laoo" typeface="DokChampa"/>
+        <a:font script="Sinh" typeface="Iskoola Pota"/>
+        <a:font script="Mong" typeface="Mongolian Baiti"/>
+        <a:font script="Viet" typeface="Times New Roman"/>
+        <a:font script="Uigh" typeface="Microsoft Uighur"/>
+        <a:font script="Geor" typeface="Sylfaen"/>
+      </a:majorFont>
+      <a:minorFont>
+        <a:latin typeface="Calibri" panose="020F0502020204030204"/>
+        <a:ea typeface=""/>
+        <a:cs typeface=""/>
+        <a:font script="Jpan" typeface="游ゴシック"/>
+        <a:font script="Hang" typeface="맑은 고딕"/>
+        <a:font script="Hans" typeface="等线"/>
+        <a:font script="Hant" typeface="新細明體"/>
+        <a:font script="Arab" typeface="Arial"/>
+        <a:font script="Hebr" typeface="Arial"/>
+        <a:font script="Thai" typeface="Cordia New"/>
+        <a:font script="Ethi" typeface="Nyala"/>
+        <a:font script="Beng" typeface="Vrinda"/>
+        <a:font script="Gujr" typeface="Shruti"/>
+        <a:font script="Khmr" typeface="DaunPenh"/>
+        <a:font script="Knda" typeface="Tunga"/>
+        <a:font script="Guru" typeface="Raavi"/>
+        <a:font script="Cans" typeface="Euphemia"/>
+        <a:font script="Cher" typeface="Plantagenet Cherokee"/>
+        <a:font script="Yiii" typeface="Microsoft Yi Baiti"/>
+        <a:font script="Tibt" typeface="Microsoft Himalaya"/>
+        <a:font script="Thaa" typeface="MV Boli"/>
+        <a:font script="Deva" typeface="Mangal"/>
+        <a:font script="Telu" typeface="Gautami"/>
+        <a:font script="Taml" typeface="Latha"/>
+        <a:font script="Syrc" typeface="Estrangelo Edessa"/>
+        <a:font script="Orya" typeface="Kalinga"/>
+        <a:font script="Mlym" typeface="Kartika"/>
+        <a:font script="Laoo" typeface="DokChampa"/>
+        <a:font script="Sinh" typeface="Iskoola Pota"/>
+        <a:font script="Mong" typeface="Mongolian Baiti"/>
+        <a:font script="Viet" typeface="Arial"/>
+        <a:font script="Uigh" typeface="Microsoft Uighur"/>
+        <a:font script="Geor" typeface="Sylfaen"/>
+      </a:minorFont>
+    </a:fontScheme>
+    <a:fmtScheme name="Office">
+      <a:fillStyleLst>
+        <a:solidFill>
+          <a:schemeClr val="phClr"/>
+        </a:solidFill>
+        <a:gradFill rotWithShape="1">
+          <a:gsLst>
+            <a:gs pos="0">
+              <a:schemeClr val="phClr">
+                <a:lumMod val="110000"/>
+                <a:satMod val="105000"/>
+                <a:tint val="67000"/>
+              </a:schemeClr>
+            </a:gs>
+            <a:gs pos="50000">
+              <a:schemeClr val="phClr">
+                <a:lumMod val="105000"/>
+                <a:satMod val="103000"/>
+                <a:tint val="73000"/>
+              </a:schemeClr>
+            </a:gs>
+            <a:gs pos="100000">
+              <a:schemeClr val="phClr">
+                <a:lumMod val="105000"/>
+                <a:satMod val="109000"/>
+                <a:tint val="81000"/>
+              </a:schemeClr>
+            </a:gs>
+          </a:gsLst>
+          <a:lin ang="5400000" scaled="0"/>
+        </a:gradFill>
+        <a:gradFill rotWithShape="1">
+          <a:gsLst>
+            <a:gs pos="0">
+              <a:schemeClr val="phClr">
+                <a:satMod val="103000"/>
+                <a:lumMod val="102000"/>
+                <a:tint val="94000"/>
+              </a:schemeClr>
+            </a:gs>
+            <a:gs pos="50000">
+              <a:schemeClr val="phClr">
+                <a:satMod val="110000"/>
+                <a:lumMod val="100000"/>
+                <a:shade val="100000"/>
+              </a:schemeClr>
+            </a:gs>
+            <a:gs pos="100000">
+              <a:schemeClr val="phClr">
+                <a:lumMod val="99000"/>
+                <a:satMod val="120000"/>
+                <a:shade val="78000"/>
+              </a:schemeClr>
+            </a:gs>
+          </a:gsLst>
+          <a:lin ang="5400000" scaled="0"/>
+        </a:gradFill>
+      </a:fillStyleLst>
+      <a:lnStyleLst>
+        <a:ln w="6350" cap="flat" cmpd="sng" algn="ctr">
+          <a:solidFill>
+            <a:schemeClr val="phClr"/>
+          </a:solidFill>
+          <a:prstDash val="solid"/>
+          <a:miter lim="800000"/>
+        </a:ln>
+        <a:ln w="12700" cap="flat" cmpd="sng" algn="ctr">
+          <a:solidFill>
+            <a:schemeClr val="phClr"/>
+          </a:solidFill>
+          <a:prstDash val="solid"/>
+          <a:miter lim="800000"/>
+        </a:ln>
+        <a:ln w="19050" cap="flat" cmpd="sng" algn="ctr">
+          <a:solidFill>
+            <a:schemeClr val="phClr"/>
+          </a:solidFill>
+          <a:prstDash val="solid"/>
+          <a:miter lim="800000"/>
+        </a:ln>
+      </a:lnStyleLst>
+      <a:effectStyleLst>
+        <a:effectStyle>
+          <a:effectLst/>
+        </a:effectStyle>
+        <a:effectStyle>
+          <a:effectLst/>
+        </a:effectStyle>
+        <a:effectStyle>
+          <a:effectLst>
+            <a:outerShdw blurRad="57150" dist="19050" dir="5400000" algn="ctr" rotWithShape="0">
+              <a:srgbClr val="000000">
+                <a:alpha val="63000"/>
+              </a:srgbClr>
+            </a:outerShdw>
+          </a:effectLst>
+        </a:effectStyle>
+      </a:effectStyleLst>
+      <a:bgFillStyleLst>
+        <a:solidFill>
+          <a:schemeClr val="phClr"/>
+        </a:solidFill>
+        <a:solidFill>
+          <a:schemeClr val="phClr">
+            <a:tint val="95000"/>
+            <a:satMod val="170000"/>
+          </a:schemeClr>
+        </a:solidFill>
+        <a:gradFill rotWithShape="1">
+          <a:gsLst>
+            <a:gs pos="0">
+              <a:schemeClr val="phClr">
+                <a:tint val="93000"/>
+                <a:satMod val="150000"/>
+                <a:shade val="98000"/>
+                <a:lumMod val="102000"/>
+              </a:schemeClr>
+            </a:gs>
+            <a:gs pos="50000">
+              <a:schemeClr val="phClr">
+                <a:tint val="98000"/>
+                <a:satMod val="130000"/>
+                <a:shade val="90000"/>
+                <a:lumMod val="103000"/>
+              </a:schemeClr>
+            </a:gs>
+            <a:gs pos="100000">
+              <a:schemeClr val="phClr">
+                <a:shade val="63000"/>
+                <a:satMod val="120000"/>
+              </a:schemeClr>
+            </a:gs>
+          </a:gsLst>
+          <a:lin ang="5400000" scaled="0"/>
+        </a:gradFill>
+      </a:bgFillStyleLst>
+    </a:fmtScheme>
+  </a:themeElements>
+  <a:objectDefaults/>
+  <a:extraClrSchemeLst/>
+  <a:extLst>
+    <a:ext uri="{05A4C25C-085E-4340-85A3-A5531E510DB2}">
+      <thm15:themeFamily xmlns:thm15="http://schemas.microsoft.com/office/thememl/2012/main" name="Office Theme" id="{62F939B6-93AF-4DB8-9C6B-D6C7DFDC589F}" vid="{4A3C46E8-61CC-4603-A589-7422A47A8E4A}"/>
+    </a:ext>
+  </a:extLst>
+</a:theme>
 </file>
</xml_diff>